<commit_message>
Update Developer Guide for Import and Export feature
</commit_message>
<xml_diff>
--- a/docs/diagrams/StorageComponentClassDiagram.pptx
+++ b/docs/diagrams/StorageComponentClassDiagram.pptx
@@ -107,7 +107,164 @@
       </a:defRPr>
     </a:lvl9pPr>
   </p:defaultTextStyle>
+  <p:extLst>
+    <p:ext uri="{EFAFB233-063F-42B5-8137-9DF3F51BA10A}">
+      <p15:sldGuideLst xmlns:p15="http://schemas.microsoft.com/office/powerpoint/2012/main">
+        <p15:guide id="1" orient="horz" pos="1488">
+          <p15:clr>
+            <a:srgbClr val="A4A3A4"/>
+          </p15:clr>
+        </p15:guide>
+        <p15:guide id="2" pos="2880">
+          <p15:clr>
+            <a:srgbClr val="A4A3A4"/>
+          </p15:clr>
+        </p15:guide>
+      </p15:sldGuideLst>
+    </p:ext>
+  </p:extLst>
 </p:presentation>
+</file>
+
+<file path=ppt/revisionInfo.xml><?xml version="1.0" encoding="utf-8"?>
+<p1510:revInfo xmlns:a="http://schemas.openxmlformats.org/drawingml/2006/main" xmlns:r="http://schemas.openxmlformats.org/officeDocument/2006/relationships" xmlns:p1510="http://schemas.microsoft.com/office/powerpoint/2015/10/main">
+  <p1510:revLst>
+    <p1510:client id="{902E44E6-C3E1-4EB4-B369-C99C12F5CECB}" v="7" dt="2018-10-15T10:45:19.800"/>
+  </p1510:revLst>
+</p1510:revInfo>
+</file>
+
+<file path=ppt/changesInfos/changesInfo1.xml><?xml version="1.0" encoding="utf-8"?>
+<pc:chgInfo xmlns:a="http://schemas.openxmlformats.org/drawingml/2006/main" xmlns:r="http://schemas.openxmlformats.org/officeDocument/2006/relationships" xmlns:ac="http://schemas.microsoft.com/office/drawing/2013/main/command" xmlns:pc="http://schemas.microsoft.com/office/powerpoint/2013/main/command">
+  <pc:docChgLst>
+    <pc:chgData name="Lin Si Jie" userId="3f4f3420204406c1" providerId="LiveId" clId="{902E44E6-C3E1-4EB4-B369-C99C12F5CECB}"/>
+    <pc:docChg chg="undo custSel modSld">
+      <pc:chgData name="Lin Si Jie" userId="3f4f3420204406c1" providerId="LiveId" clId="{902E44E6-C3E1-4EB4-B369-C99C12F5CECB}" dt="2018-10-15T10:50:17.564" v="45" actId="1076"/>
+      <pc:docMkLst>
+        <pc:docMk/>
+      </pc:docMkLst>
+      <pc:sldChg chg="addSp delSp modSp">
+        <pc:chgData name="Lin Si Jie" userId="3f4f3420204406c1" providerId="LiveId" clId="{902E44E6-C3E1-4EB4-B369-C99C12F5CECB}" dt="2018-10-15T10:50:17.564" v="45" actId="1076"/>
+        <pc:sldMkLst>
+          <pc:docMk/>
+          <pc:sldMk cId="1478832369" sldId="264"/>
+        </pc:sldMkLst>
+        <pc:spChg chg="mod">
+          <ac:chgData name="Lin Si Jie" userId="3f4f3420204406c1" providerId="LiveId" clId="{902E44E6-C3E1-4EB4-B369-C99C12F5CECB}" dt="2018-10-15T10:40:49.040" v="2" actId="14100"/>
+          <ac:spMkLst>
+            <pc:docMk/>
+            <pc:sldMk cId="1478832369" sldId="264"/>
+            <ac:spMk id="9" creationId="{00000000-0000-0000-0000-000000000000}"/>
+          </ac:spMkLst>
+        </pc:spChg>
+        <pc:spChg chg="add mod">
+          <ac:chgData name="Lin Si Jie" userId="3f4f3420204406c1" providerId="LiveId" clId="{902E44E6-C3E1-4EB4-B369-C99C12F5CECB}" dt="2018-10-15T10:41:20.743" v="11" actId="164"/>
+          <ac:spMkLst>
+            <pc:docMk/>
+            <pc:sldMk cId="1478832369" sldId="264"/>
+            <ac:spMk id="27" creationId="{1CB1A82D-B7B9-4751-B844-172526D6A2BB}"/>
+          </ac:spMkLst>
+        </pc:spChg>
+        <pc:spChg chg="add del">
+          <ac:chgData name="Lin Si Jie" userId="3f4f3420204406c1" providerId="LiveId" clId="{902E44E6-C3E1-4EB4-B369-C99C12F5CECB}" dt="2018-10-15T10:41:13.574" v="10"/>
+          <ac:spMkLst>
+            <pc:docMk/>
+            <pc:sldMk cId="1478832369" sldId="264"/>
+            <ac:spMk id="30" creationId="{209876F2-EE33-4149-9B5C-2EA443DAD280}"/>
+          </ac:spMkLst>
+        </pc:spChg>
+        <pc:spChg chg="add mod">
+          <ac:chgData name="Lin Si Jie" userId="3f4f3420204406c1" providerId="LiveId" clId="{902E44E6-C3E1-4EB4-B369-C99C12F5CECB}" dt="2018-10-15T10:50:17.564" v="45" actId="1076"/>
+          <ac:spMkLst>
+            <pc:docMk/>
+            <pc:sldMk cId="1478832369" sldId="264"/>
+            <ac:spMk id="32" creationId="{A2F02829-0356-4FB8-9CE0-B88093B4E8AF}"/>
+          </ac:spMkLst>
+        </pc:spChg>
+        <pc:spChg chg="add del mod">
+          <ac:chgData name="Lin Si Jie" userId="3f4f3420204406c1" providerId="LiveId" clId="{902E44E6-C3E1-4EB4-B369-C99C12F5CECB}" dt="2018-10-15T10:47:55.689" v="35" actId="478"/>
+          <ac:spMkLst>
+            <pc:docMk/>
+            <pc:sldMk cId="1478832369" sldId="264"/>
+            <ac:spMk id="34" creationId="{21E218C4-200E-474B-8F49-3F177582FB24}"/>
+          </ac:spMkLst>
+        </pc:spChg>
+        <pc:spChg chg="mod">
+          <ac:chgData name="Lin Si Jie" userId="3f4f3420204406c1" providerId="LiveId" clId="{902E44E6-C3E1-4EB4-B369-C99C12F5CECB}" dt="2018-10-15T10:41:10.152" v="8" actId="1076"/>
+          <ac:spMkLst>
+            <pc:docMk/>
+            <pc:sldMk cId="1478832369" sldId="264"/>
+            <ac:spMk id="118" creationId="{00000000-0000-0000-0000-000000000000}"/>
+          </ac:spMkLst>
+        </pc:spChg>
+        <pc:spChg chg="mod">
+          <ac:chgData name="Lin Si Jie" userId="3f4f3420204406c1" providerId="LiveId" clId="{902E44E6-C3E1-4EB4-B369-C99C12F5CECB}" dt="2018-10-15T10:40:49.040" v="2" actId="14100"/>
+          <ac:spMkLst>
+            <pc:docMk/>
+            <pc:sldMk cId="1478832369" sldId="264"/>
+            <ac:spMk id="119" creationId="{00000000-0000-0000-0000-000000000000}"/>
+          </ac:spMkLst>
+        </pc:spChg>
+        <pc:spChg chg="mod">
+          <ac:chgData name="Lin Si Jie" userId="3f4f3420204406c1" providerId="LiveId" clId="{902E44E6-C3E1-4EB4-B369-C99C12F5CECB}" dt="2018-10-15T10:40:54.247" v="3" actId="164"/>
+          <ac:spMkLst>
+            <pc:docMk/>
+            <pc:sldMk cId="1478832369" sldId="264"/>
+            <ac:spMk id="120" creationId="{00000000-0000-0000-0000-000000000000}"/>
+          </ac:spMkLst>
+        </pc:spChg>
+        <pc:grpChg chg="add mod">
+          <ac:chgData name="Lin Si Jie" userId="3f4f3420204406c1" providerId="LiveId" clId="{902E44E6-C3E1-4EB4-B369-C99C12F5CECB}" dt="2018-10-15T10:40:58.088" v="4" actId="1076"/>
+          <ac:grpSpMkLst>
+            <pc:docMk/>
+            <pc:sldMk cId="1478832369" sldId="264"/>
+            <ac:grpSpMk id="3" creationId="{CE02867F-B1C3-4BEA-9BFF-08D94FE4CC1E}"/>
+          </ac:grpSpMkLst>
+        </pc:grpChg>
+        <pc:grpChg chg="add mod">
+          <ac:chgData name="Lin Si Jie" userId="3f4f3420204406c1" providerId="LiveId" clId="{902E44E6-C3E1-4EB4-B369-C99C12F5CECB}" dt="2018-10-15T10:41:20.743" v="11" actId="164"/>
+          <ac:grpSpMkLst>
+            <pc:docMk/>
+            <pc:sldMk cId="1478832369" sldId="264"/>
+            <ac:grpSpMk id="4" creationId="{3FEF5B98-D3DD-4A37-9AAA-BE6F265ED468}"/>
+          </ac:grpSpMkLst>
+        </pc:grpChg>
+        <pc:cxnChg chg="mod">
+          <ac:chgData name="Lin Si Jie" userId="3f4f3420204406c1" providerId="LiveId" clId="{902E44E6-C3E1-4EB4-B369-C99C12F5CECB}" dt="2018-10-15T10:40:54.247" v="3" actId="164"/>
+          <ac:cxnSpMkLst>
+            <pc:docMk/>
+            <pc:sldMk cId="1478832369" sldId="264"/>
+            <ac:cxnSpMk id="21" creationId="{00000000-0000-0000-0000-000000000000}"/>
+          </ac:cxnSpMkLst>
+        </pc:cxnChg>
+        <pc:cxnChg chg="add mod">
+          <ac:chgData name="Lin Si Jie" userId="3f4f3420204406c1" providerId="LiveId" clId="{902E44E6-C3E1-4EB4-B369-C99C12F5CECB}" dt="2018-10-15T10:41:20.743" v="11" actId="164"/>
+          <ac:cxnSpMkLst>
+            <pc:docMk/>
+            <pc:sldMk cId="1478832369" sldId="264"/>
+            <ac:cxnSpMk id="26" creationId="{A2AB4250-FF21-406B-98CC-8CD1CCEC2E0E}"/>
+          </ac:cxnSpMkLst>
+        </pc:cxnChg>
+        <pc:cxnChg chg="add del">
+          <ac:chgData name="Lin Si Jie" userId="3f4f3420204406c1" providerId="LiveId" clId="{902E44E6-C3E1-4EB4-B369-C99C12F5CECB}" dt="2018-10-15T10:41:13.574" v="10"/>
+          <ac:cxnSpMkLst>
+            <pc:docMk/>
+            <pc:sldMk cId="1478832369" sldId="264"/>
+            <ac:cxnSpMk id="29" creationId="{EA764863-D227-4C73-BD7C-BC60AD628A07}"/>
+          </ac:cxnSpMkLst>
+        </pc:cxnChg>
+        <pc:cxnChg chg="add mod">
+          <ac:chgData name="Lin Si Jie" userId="3f4f3420204406c1" providerId="LiveId" clId="{902E44E6-C3E1-4EB4-B369-C99C12F5CECB}" dt="2018-10-15T10:48:54.453" v="44" actId="692"/>
+          <ac:cxnSpMkLst>
+            <pc:docMk/>
+            <pc:sldMk cId="1478832369" sldId="264"/>
+            <ac:cxnSpMk id="33" creationId="{95B6788E-D3FA-4B57-A044-3E5CE08D4084}"/>
+          </ac:cxnSpMkLst>
+        </pc:cxnChg>
+      </pc:sldChg>
+    </pc:docChg>
+  </pc:docChgLst>
+</pc:chgInfo>
 </file>
 
 <file path=ppt/notesMasters/notesMaster1.xml><?xml version="1.0" encoding="utf-8"?>
@@ -192,7 +349,7 @@
           <a:p>
             <a:fld id="{F5CC4B3F-88C1-4FFA-B1B6-F41C21DC6924}" type="datetimeFigureOut">
               <a:rPr lang="en-US" smtClean="0"/>
-              <a:t>10/16/2016</a:t>
+              <a:t>15-Oct-18</a:t>
             </a:fld>
             <a:endParaRPr lang="en-US"/>
           </a:p>
@@ -256,38 +413,37 @@
           <a:p>
             <a:pPr lvl="0"/>
             <a:r>
-              <a:rPr lang="en-US" smtClean="0"/>
+              <a:rPr lang="en-US"/>
               <a:t>Click to edit Master text styles</a:t>
             </a:r>
           </a:p>
           <a:p>
             <a:pPr lvl="1"/>
             <a:r>
-              <a:rPr lang="en-US" smtClean="0"/>
+              <a:rPr lang="en-US"/>
               <a:t>Second level</a:t>
             </a:r>
           </a:p>
           <a:p>
             <a:pPr lvl="2"/>
             <a:r>
-              <a:rPr lang="en-US" smtClean="0"/>
+              <a:rPr lang="en-US"/>
               <a:t>Third level</a:t>
             </a:r>
           </a:p>
           <a:p>
             <a:pPr lvl="3"/>
             <a:r>
-              <a:rPr lang="en-US" smtClean="0"/>
+              <a:rPr lang="en-US"/>
               <a:t>Fourth level</a:t>
             </a:r>
           </a:p>
           <a:p>
             <a:pPr lvl="4"/>
             <a:r>
-              <a:rPr lang="en-US" smtClean="0"/>
+              <a:rPr lang="en-US"/>
               <a:t>Fifth level</a:t>
             </a:r>
-            <a:endParaRPr lang="en-US"/>
           </a:p>
         </p:txBody>
       </p:sp>
@@ -498,10 +654,9 @@
           <a:lstStyle/>
           <a:p>
             <a:r>
-              <a:rPr lang="en-US" smtClean="0"/>
+              <a:rPr lang="en-US"/>
               <a:t>Click to edit Master title style</a:t>
             </a:r>
-            <a:endParaRPr lang="en-US"/>
           </a:p>
         </p:txBody>
       </p:sp>
@@ -617,10 +772,9 @@
           </a:lstStyle>
           <a:p>
             <a:r>
-              <a:rPr lang="en-US" smtClean="0"/>
+              <a:rPr lang="en-US"/>
               <a:t>Click to edit Master subtitle style</a:t>
             </a:r>
-            <a:endParaRPr lang="en-US"/>
           </a:p>
         </p:txBody>
       </p:sp>
@@ -641,7 +795,7 @@
           <a:p>
             <a:fld id="{78C97017-6FC3-485B-9764-EAC9E56C1D49}" type="datetimeFigureOut">
               <a:rPr lang="en-US" smtClean="0"/>
-              <a:t>10/16/2016</a:t>
+              <a:t>15-Oct-18</a:t>
             </a:fld>
             <a:endParaRPr lang="en-US"/>
           </a:p>
@@ -735,10 +889,9 @@
           <a:lstStyle/>
           <a:p>
             <a:r>
-              <a:rPr lang="en-US" smtClean="0"/>
+              <a:rPr lang="en-US"/>
               <a:t>Click to edit Master title style</a:t>
             </a:r>
-            <a:endParaRPr lang="en-US"/>
           </a:p>
         </p:txBody>
       </p:sp>
@@ -759,38 +912,37 @@
           <a:p>
             <a:pPr lvl="0"/>
             <a:r>
-              <a:rPr lang="en-US" smtClean="0"/>
+              <a:rPr lang="en-US"/>
               <a:t>Click to edit Master text styles</a:t>
             </a:r>
           </a:p>
           <a:p>
             <a:pPr lvl="1"/>
             <a:r>
-              <a:rPr lang="en-US" smtClean="0"/>
+              <a:rPr lang="en-US"/>
               <a:t>Second level</a:t>
             </a:r>
           </a:p>
           <a:p>
             <a:pPr lvl="2"/>
             <a:r>
-              <a:rPr lang="en-US" smtClean="0"/>
+              <a:rPr lang="en-US"/>
               <a:t>Third level</a:t>
             </a:r>
           </a:p>
           <a:p>
             <a:pPr lvl="3"/>
             <a:r>
-              <a:rPr lang="en-US" smtClean="0"/>
+              <a:rPr lang="en-US"/>
               <a:t>Fourth level</a:t>
             </a:r>
           </a:p>
           <a:p>
             <a:pPr lvl="4"/>
             <a:r>
-              <a:rPr lang="en-US" smtClean="0"/>
+              <a:rPr lang="en-US"/>
               <a:t>Fifth level</a:t>
             </a:r>
-            <a:endParaRPr lang="en-US"/>
           </a:p>
         </p:txBody>
       </p:sp>
@@ -811,7 +963,7 @@
           <a:p>
             <a:fld id="{78C97017-6FC3-485B-9764-EAC9E56C1D49}" type="datetimeFigureOut">
               <a:rPr lang="en-US" smtClean="0"/>
-              <a:t>10/16/2016</a:t>
+              <a:t>15-Oct-18</a:t>
             </a:fld>
             <a:endParaRPr lang="en-US"/>
           </a:p>
@@ -910,10 +1062,9 @@
           <a:lstStyle/>
           <a:p>
             <a:r>
-              <a:rPr lang="en-US" smtClean="0"/>
+              <a:rPr lang="en-US"/>
               <a:t>Click to edit Master title style</a:t>
             </a:r>
-            <a:endParaRPr lang="en-US"/>
           </a:p>
         </p:txBody>
       </p:sp>
@@ -939,38 +1090,37 @@
           <a:p>
             <a:pPr lvl="0"/>
             <a:r>
-              <a:rPr lang="en-US" smtClean="0"/>
+              <a:rPr lang="en-US"/>
               <a:t>Click to edit Master text styles</a:t>
             </a:r>
           </a:p>
           <a:p>
             <a:pPr lvl="1"/>
             <a:r>
-              <a:rPr lang="en-US" smtClean="0"/>
+              <a:rPr lang="en-US"/>
               <a:t>Second level</a:t>
             </a:r>
           </a:p>
           <a:p>
             <a:pPr lvl="2"/>
             <a:r>
-              <a:rPr lang="en-US" smtClean="0"/>
+              <a:rPr lang="en-US"/>
               <a:t>Third level</a:t>
             </a:r>
           </a:p>
           <a:p>
             <a:pPr lvl="3"/>
             <a:r>
-              <a:rPr lang="en-US" smtClean="0"/>
+              <a:rPr lang="en-US"/>
               <a:t>Fourth level</a:t>
             </a:r>
           </a:p>
           <a:p>
             <a:pPr lvl="4"/>
             <a:r>
-              <a:rPr lang="en-US" smtClean="0"/>
+              <a:rPr lang="en-US"/>
               <a:t>Fifth level</a:t>
             </a:r>
-            <a:endParaRPr lang="en-US"/>
           </a:p>
         </p:txBody>
       </p:sp>
@@ -991,7 +1141,7 @@
           <a:p>
             <a:fld id="{78C97017-6FC3-485B-9764-EAC9E56C1D49}" type="datetimeFigureOut">
               <a:rPr lang="en-US" smtClean="0"/>
-              <a:t>10/16/2016</a:t>
+              <a:t>15-Oct-18</a:t>
             </a:fld>
             <a:endParaRPr lang="en-US"/>
           </a:p>
@@ -1085,10 +1235,9 @@
           <a:lstStyle/>
           <a:p>
             <a:r>
-              <a:rPr lang="en-US" smtClean="0"/>
+              <a:rPr lang="en-US"/>
               <a:t>Click to edit Master title style</a:t>
             </a:r>
-            <a:endParaRPr lang="en-US"/>
           </a:p>
         </p:txBody>
       </p:sp>
@@ -1109,38 +1258,37 @@
           <a:p>
             <a:pPr lvl="0"/>
             <a:r>
-              <a:rPr lang="en-US" smtClean="0"/>
+              <a:rPr lang="en-US"/>
               <a:t>Click to edit Master text styles</a:t>
             </a:r>
           </a:p>
           <a:p>
             <a:pPr lvl="1"/>
             <a:r>
-              <a:rPr lang="en-US" smtClean="0"/>
+              <a:rPr lang="en-US"/>
               <a:t>Second level</a:t>
             </a:r>
           </a:p>
           <a:p>
             <a:pPr lvl="2"/>
             <a:r>
-              <a:rPr lang="en-US" smtClean="0"/>
+              <a:rPr lang="en-US"/>
               <a:t>Third level</a:t>
             </a:r>
           </a:p>
           <a:p>
             <a:pPr lvl="3"/>
             <a:r>
-              <a:rPr lang="en-US" smtClean="0"/>
+              <a:rPr lang="en-US"/>
               <a:t>Fourth level</a:t>
             </a:r>
           </a:p>
           <a:p>
             <a:pPr lvl="4"/>
             <a:r>
-              <a:rPr lang="en-US" smtClean="0"/>
+              <a:rPr lang="en-US"/>
               <a:t>Fifth level</a:t>
             </a:r>
-            <a:endParaRPr lang="en-US"/>
           </a:p>
         </p:txBody>
       </p:sp>
@@ -1161,7 +1309,7 @@
           <a:p>
             <a:fld id="{78C97017-6FC3-485B-9764-EAC9E56C1D49}" type="datetimeFigureOut">
               <a:rPr lang="en-US" smtClean="0"/>
-              <a:t>10/16/2016</a:t>
+              <a:t>15-Oct-18</a:t>
             </a:fld>
             <a:endParaRPr lang="en-US"/>
           </a:p>
@@ -1264,10 +1412,9 @@
           </a:lstStyle>
           <a:p>
             <a:r>
-              <a:rPr lang="en-US" smtClean="0"/>
+              <a:rPr lang="en-US"/>
               <a:t>Click to edit Master title style</a:t>
             </a:r>
-            <a:endParaRPr lang="en-US"/>
           </a:p>
         </p:txBody>
       </p:sp>
@@ -1384,7 +1531,7 @@
           <a:p>
             <a:pPr lvl="0"/>
             <a:r>
-              <a:rPr lang="en-US" smtClean="0"/>
+              <a:rPr lang="en-US"/>
               <a:t>Click to edit Master text styles</a:t>
             </a:r>
           </a:p>
@@ -1407,7 +1554,7 @@
           <a:p>
             <a:fld id="{78C97017-6FC3-485B-9764-EAC9E56C1D49}" type="datetimeFigureOut">
               <a:rPr lang="en-US" smtClean="0"/>
-              <a:t>10/16/2016</a:t>
+              <a:t>15-Oct-18</a:t>
             </a:fld>
             <a:endParaRPr lang="en-US"/>
           </a:p>
@@ -1501,10 +1648,9 @@
           <a:lstStyle/>
           <a:p>
             <a:r>
-              <a:rPr lang="en-US" smtClean="0"/>
+              <a:rPr lang="en-US"/>
               <a:t>Click to edit Master title style</a:t>
             </a:r>
-            <a:endParaRPr lang="en-US"/>
           </a:p>
         </p:txBody>
       </p:sp>
@@ -1558,38 +1704,37 @@
           <a:p>
             <a:pPr lvl="0"/>
             <a:r>
-              <a:rPr lang="en-US" smtClean="0"/>
+              <a:rPr lang="en-US"/>
               <a:t>Click to edit Master text styles</a:t>
             </a:r>
           </a:p>
           <a:p>
             <a:pPr lvl="1"/>
             <a:r>
-              <a:rPr lang="en-US" smtClean="0"/>
+              <a:rPr lang="en-US"/>
               <a:t>Second level</a:t>
             </a:r>
           </a:p>
           <a:p>
             <a:pPr lvl="2"/>
             <a:r>
-              <a:rPr lang="en-US" smtClean="0"/>
+              <a:rPr lang="en-US"/>
               <a:t>Third level</a:t>
             </a:r>
           </a:p>
           <a:p>
             <a:pPr lvl="3"/>
             <a:r>
-              <a:rPr lang="en-US" smtClean="0"/>
+              <a:rPr lang="en-US"/>
               <a:t>Fourth level</a:t>
             </a:r>
           </a:p>
           <a:p>
             <a:pPr lvl="4"/>
             <a:r>
-              <a:rPr lang="en-US" smtClean="0"/>
+              <a:rPr lang="en-US"/>
               <a:t>Fifth level</a:t>
             </a:r>
-            <a:endParaRPr lang="en-US"/>
           </a:p>
         </p:txBody>
       </p:sp>
@@ -1643,38 +1788,37 @@
           <a:p>
             <a:pPr lvl="0"/>
             <a:r>
-              <a:rPr lang="en-US" smtClean="0"/>
+              <a:rPr lang="en-US"/>
               <a:t>Click to edit Master text styles</a:t>
             </a:r>
           </a:p>
           <a:p>
             <a:pPr lvl="1"/>
             <a:r>
-              <a:rPr lang="en-US" smtClean="0"/>
+              <a:rPr lang="en-US"/>
               <a:t>Second level</a:t>
             </a:r>
           </a:p>
           <a:p>
             <a:pPr lvl="2"/>
             <a:r>
-              <a:rPr lang="en-US" smtClean="0"/>
+              <a:rPr lang="en-US"/>
               <a:t>Third level</a:t>
             </a:r>
           </a:p>
           <a:p>
             <a:pPr lvl="3"/>
             <a:r>
-              <a:rPr lang="en-US" smtClean="0"/>
+              <a:rPr lang="en-US"/>
               <a:t>Fourth level</a:t>
             </a:r>
           </a:p>
           <a:p>
             <a:pPr lvl="4"/>
             <a:r>
-              <a:rPr lang="en-US" smtClean="0"/>
+              <a:rPr lang="en-US"/>
               <a:t>Fifth level</a:t>
             </a:r>
-            <a:endParaRPr lang="en-US"/>
           </a:p>
         </p:txBody>
       </p:sp>
@@ -1695,7 +1839,7 @@
           <a:p>
             <a:fld id="{78C97017-6FC3-485B-9764-EAC9E56C1D49}" type="datetimeFigureOut">
               <a:rPr lang="en-US" smtClean="0"/>
-              <a:t>10/16/2016</a:t>
+              <a:t>15-Oct-18</a:t>
             </a:fld>
             <a:endParaRPr lang="en-US"/>
           </a:p>
@@ -1793,10 +1937,9 @@
           </a:lstStyle>
           <a:p>
             <a:r>
-              <a:rPr lang="en-US" smtClean="0"/>
+              <a:rPr lang="en-US"/>
               <a:t>Click to edit Master title style</a:t>
             </a:r>
-            <a:endParaRPr lang="en-US"/>
           </a:p>
         </p:txBody>
       </p:sp>
@@ -1859,7 +2002,7 @@
           <a:p>
             <a:pPr lvl="0"/>
             <a:r>
-              <a:rPr lang="en-US" smtClean="0"/>
+              <a:rPr lang="en-US"/>
               <a:t>Click to edit Master text styles</a:t>
             </a:r>
           </a:p>
@@ -1915,38 +2058,37 @@
           <a:p>
             <a:pPr lvl="0"/>
             <a:r>
-              <a:rPr lang="en-US" smtClean="0"/>
+              <a:rPr lang="en-US"/>
               <a:t>Click to edit Master text styles</a:t>
             </a:r>
           </a:p>
           <a:p>
             <a:pPr lvl="1"/>
             <a:r>
-              <a:rPr lang="en-US" smtClean="0"/>
+              <a:rPr lang="en-US"/>
               <a:t>Second level</a:t>
             </a:r>
           </a:p>
           <a:p>
             <a:pPr lvl="2"/>
             <a:r>
-              <a:rPr lang="en-US" smtClean="0"/>
+              <a:rPr lang="en-US"/>
               <a:t>Third level</a:t>
             </a:r>
           </a:p>
           <a:p>
             <a:pPr lvl="3"/>
             <a:r>
-              <a:rPr lang="en-US" smtClean="0"/>
+              <a:rPr lang="en-US"/>
               <a:t>Fourth level</a:t>
             </a:r>
           </a:p>
           <a:p>
             <a:pPr lvl="4"/>
             <a:r>
-              <a:rPr lang="en-US" smtClean="0"/>
+              <a:rPr lang="en-US"/>
               <a:t>Fifth level</a:t>
             </a:r>
-            <a:endParaRPr lang="en-US"/>
           </a:p>
         </p:txBody>
       </p:sp>
@@ -2009,7 +2151,7 @@
           <a:p>
             <a:pPr lvl="0"/>
             <a:r>
-              <a:rPr lang="en-US" smtClean="0"/>
+              <a:rPr lang="en-US"/>
               <a:t>Click to edit Master text styles</a:t>
             </a:r>
           </a:p>
@@ -2065,38 +2207,37 @@
           <a:p>
             <a:pPr lvl="0"/>
             <a:r>
-              <a:rPr lang="en-US" smtClean="0"/>
+              <a:rPr lang="en-US"/>
               <a:t>Click to edit Master text styles</a:t>
             </a:r>
           </a:p>
           <a:p>
             <a:pPr lvl="1"/>
             <a:r>
-              <a:rPr lang="en-US" smtClean="0"/>
+              <a:rPr lang="en-US"/>
               <a:t>Second level</a:t>
             </a:r>
           </a:p>
           <a:p>
             <a:pPr lvl="2"/>
             <a:r>
-              <a:rPr lang="en-US" smtClean="0"/>
+              <a:rPr lang="en-US"/>
               <a:t>Third level</a:t>
             </a:r>
           </a:p>
           <a:p>
             <a:pPr lvl="3"/>
             <a:r>
-              <a:rPr lang="en-US" smtClean="0"/>
+              <a:rPr lang="en-US"/>
               <a:t>Fourth level</a:t>
             </a:r>
           </a:p>
           <a:p>
             <a:pPr lvl="4"/>
             <a:r>
-              <a:rPr lang="en-US" smtClean="0"/>
+              <a:rPr lang="en-US"/>
               <a:t>Fifth level</a:t>
             </a:r>
-            <a:endParaRPr lang="en-US"/>
           </a:p>
         </p:txBody>
       </p:sp>
@@ -2117,7 +2258,7 @@
           <a:p>
             <a:fld id="{78C97017-6FC3-485B-9764-EAC9E56C1D49}" type="datetimeFigureOut">
               <a:rPr lang="en-US" smtClean="0"/>
-              <a:t>10/16/2016</a:t>
+              <a:t>15-Oct-18</a:t>
             </a:fld>
             <a:endParaRPr lang="en-US"/>
           </a:p>
@@ -2211,10 +2352,9 @@
           <a:lstStyle/>
           <a:p>
             <a:r>
-              <a:rPr lang="en-US" smtClean="0"/>
+              <a:rPr lang="en-US"/>
               <a:t>Click to edit Master title style</a:t>
             </a:r>
-            <a:endParaRPr lang="en-US"/>
           </a:p>
         </p:txBody>
       </p:sp>
@@ -2235,7 +2375,7 @@
           <a:p>
             <a:fld id="{78C97017-6FC3-485B-9764-EAC9E56C1D49}" type="datetimeFigureOut">
               <a:rPr lang="en-US" smtClean="0"/>
-              <a:t>10/16/2016</a:t>
+              <a:t>15-Oct-18</a:t>
             </a:fld>
             <a:endParaRPr lang="en-US"/>
           </a:p>
@@ -2330,7 +2470,7 @@
           <a:p>
             <a:fld id="{78C97017-6FC3-485B-9764-EAC9E56C1D49}" type="datetimeFigureOut">
               <a:rPr lang="en-US" smtClean="0"/>
-              <a:t>10/16/2016</a:t>
+              <a:t>15-Oct-18</a:t>
             </a:fld>
             <a:endParaRPr lang="en-US"/>
           </a:p>
@@ -2433,10 +2573,9 @@
           </a:lstStyle>
           <a:p>
             <a:r>
-              <a:rPr lang="en-US" smtClean="0"/>
+              <a:rPr lang="en-US"/>
               <a:t>Click to edit Master title style</a:t>
             </a:r>
-            <a:endParaRPr lang="en-US"/>
           </a:p>
         </p:txBody>
       </p:sp>
@@ -2490,38 +2629,37 @@
           <a:p>
             <a:pPr lvl="0"/>
             <a:r>
-              <a:rPr lang="en-US" smtClean="0"/>
+              <a:rPr lang="en-US"/>
               <a:t>Click to edit Master text styles</a:t>
             </a:r>
           </a:p>
           <a:p>
             <a:pPr lvl="1"/>
             <a:r>
-              <a:rPr lang="en-US" smtClean="0"/>
+              <a:rPr lang="en-US"/>
               <a:t>Second level</a:t>
             </a:r>
           </a:p>
           <a:p>
             <a:pPr lvl="2"/>
             <a:r>
-              <a:rPr lang="en-US" smtClean="0"/>
+              <a:rPr lang="en-US"/>
               <a:t>Third level</a:t>
             </a:r>
           </a:p>
           <a:p>
             <a:pPr lvl="3"/>
             <a:r>
-              <a:rPr lang="en-US" smtClean="0"/>
+              <a:rPr lang="en-US"/>
               <a:t>Fourth level</a:t>
             </a:r>
           </a:p>
           <a:p>
             <a:pPr lvl="4"/>
             <a:r>
-              <a:rPr lang="en-US" smtClean="0"/>
+              <a:rPr lang="en-US"/>
               <a:t>Fifth level</a:t>
             </a:r>
-            <a:endParaRPr lang="en-US"/>
           </a:p>
         </p:txBody>
       </p:sp>
@@ -2584,7 +2722,7 @@
           <a:p>
             <a:pPr lvl="0"/>
             <a:r>
-              <a:rPr lang="en-US" smtClean="0"/>
+              <a:rPr lang="en-US"/>
               <a:t>Click to edit Master text styles</a:t>
             </a:r>
           </a:p>
@@ -2607,7 +2745,7 @@
           <a:p>
             <a:fld id="{78C97017-6FC3-485B-9764-EAC9E56C1D49}" type="datetimeFigureOut">
               <a:rPr lang="en-US" smtClean="0"/>
-              <a:t>10/16/2016</a:t>
+              <a:t>15-Oct-18</a:t>
             </a:fld>
             <a:endParaRPr lang="en-US"/>
           </a:p>
@@ -2710,10 +2848,9 @@
           </a:lstStyle>
           <a:p>
             <a:r>
-              <a:rPr lang="en-US" smtClean="0"/>
+              <a:rPr lang="en-US"/>
               <a:t>Click to edit Master title style</a:t>
             </a:r>
-            <a:endParaRPr lang="en-US"/>
           </a:p>
         </p:txBody>
       </p:sp>
@@ -2837,7 +2974,7 @@
           <a:p>
             <a:pPr lvl="0"/>
             <a:r>
-              <a:rPr lang="en-US" smtClean="0"/>
+              <a:rPr lang="en-US"/>
               <a:t>Click to edit Master text styles</a:t>
             </a:r>
           </a:p>
@@ -2860,7 +2997,7 @@
           <a:p>
             <a:fld id="{78C97017-6FC3-485B-9764-EAC9E56C1D49}" type="datetimeFigureOut">
               <a:rPr lang="en-US" smtClean="0"/>
-              <a:t>10/16/2016</a:t>
+              <a:t>15-Oct-18</a:t>
             </a:fld>
             <a:endParaRPr lang="en-US"/>
           </a:p>
@@ -2969,10 +3106,9 @@
           <a:lstStyle/>
           <a:p>
             <a:r>
-              <a:rPr lang="en-US" smtClean="0"/>
+              <a:rPr lang="en-US"/>
               <a:t>Click to edit Master title style</a:t>
             </a:r>
-            <a:endParaRPr lang="en-US"/>
           </a:p>
         </p:txBody>
       </p:sp>
@@ -3003,38 +3139,37 @@
           <a:p>
             <a:pPr lvl="0"/>
             <a:r>
-              <a:rPr lang="en-US" smtClean="0"/>
+              <a:rPr lang="en-US"/>
               <a:t>Click to edit Master text styles</a:t>
             </a:r>
           </a:p>
           <a:p>
             <a:pPr lvl="1"/>
             <a:r>
-              <a:rPr lang="en-US" smtClean="0"/>
+              <a:rPr lang="en-US"/>
               <a:t>Second level</a:t>
             </a:r>
           </a:p>
           <a:p>
             <a:pPr lvl="2"/>
             <a:r>
-              <a:rPr lang="en-US" smtClean="0"/>
+              <a:rPr lang="en-US"/>
               <a:t>Third level</a:t>
             </a:r>
           </a:p>
           <a:p>
             <a:pPr lvl="3"/>
             <a:r>
-              <a:rPr lang="en-US" smtClean="0"/>
+              <a:rPr lang="en-US"/>
               <a:t>Fourth level</a:t>
             </a:r>
           </a:p>
           <a:p>
             <a:pPr lvl="4"/>
             <a:r>
-              <a:rPr lang="en-US" smtClean="0"/>
+              <a:rPr lang="en-US"/>
               <a:t>Fifth level</a:t>
             </a:r>
-            <a:endParaRPr lang="en-US"/>
           </a:p>
         </p:txBody>
       </p:sp>
@@ -3073,7 +3208,7 @@
           <a:p>
             <a:fld id="{78C97017-6FC3-485B-9764-EAC9E56C1D49}" type="datetimeFigureOut">
               <a:rPr lang="en-US" smtClean="0"/>
-              <a:t>10/16/2016</a:t>
+              <a:t>15-Oct-18</a:t>
             </a:fld>
             <a:endParaRPr lang="en-US"/>
           </a:p>
@@ -3456,8 +3591,8 @@
         </p:nvSpPr>
         <p:spPr>
           <a:xfrm>
-            <a:off x="1119865" y="2086382"/>
-            <a:ext cx="7871735" cy="1723618"/>
+            <a:off x="1143000" y="2120038"/>
+            <a:ext cx="7871735" cy="2547518"/>
           </a:xfrm>
           <a:prstGeom prst="roundRect">
             <a:avLst>
@@ -3494,7 +3629,7 @@
           <a:lstStyle/>
           <a:p>
             <a:r>
-              <a:rPr lang="en-US" sz="1200" b="1" dirty="0" smtClean="0">
+              <a:rPr lang="en-US" sz="1200" b="1" dirty="0">
                 <a:solidFill>
                   <a:schemeClr val="accent6">
                     <a:lumMod val="75000"/>
@@ -3561,7 +3696,7 @@
           <a:p>
             <a:pPr algn="ctr"/>
             <a:r>
-              <a:rPr lang="en-US" sz="1050" dirty="0" smtClean="0">
+              <a:rPr lang="en-US" sz="1050" dirty="0">
                 <a:solidFill>
                   <a:schemeClr val="bg1"/>
                 </a:solidFill>
@@ -3569,14 +3704,14 @@
               <a:t>&lt;&lt;interface&gt;&gt;</a:t>
             </a:r>
             <a:br>
-              <a:rPr lang="en-US" sz="1050" dirty="0" smtClean="0">
+              <a:rPr lang="en-US" sz="1050" dirty="0">
                 <a:solidFill>
                   <a:schemeClr val="bg1"/>
                 </a:solidFill>
               </a:rPr>
             </a:br>
             <a:r>
-              <a:rPr lang="en-US" sz="1050" dirty="0" err="1" smtClean="0">
+              <a:rPr lang="en-US" sz="1050" dirty="0" err="1">
                 <a:solidFill>
                   <a:schemeClr val="bg1"/>
                 </a:solidFill>
@@ -3599,8 +3734,8 @@
         </p:nvSpPr>
         <p:spPr>
           <a:xfrm rot="16200000">
-            <a:off x="1683963" y="2868687"/>
-            <a:ext cx="1093635" cy="346760"/>
+            <a:off x="1306707" y="3245943"/>
+            <a:ext cx="1848148" cy="346760"/>
           </a:xfrm>
           <a:prstGeom prst="rect">
             <a:avLst/>
@@ -3639,7 +3774,7 @@
           <a:p>
             <a:pPr algn="ctr"/>
             <a:r>
-              <a:rPr lang="en-US" sz="1050" dirty="0" err="1" smtClean="0">
+              <a:rPr lang="en-US" sz="1050" dirty="0" err="1">
                 <a:solidFill>
                   <a:schemeClr val="bg1"/>
                 </a:solidFill>
@@ -3662,8 +3797,8 @@
         </p:nvSpPr>
         <p:spPr>
           <a:xfrm rot="16200000">
-            <a:off x="956202" y="2861202"/>
-            <a:ext cx="1093635" cy="346760"/>
+            <a:off x="578946" y="3238458"/>
+            <a:ext cx="1848148" cy="346760"/>
           </a:xfrm>
           <a:prstGeom prst="rect">
             <a:avLst/>
@@ -3713,7 +3848,7 @@
           <a:p>
             <a:pPr algn="ctr"/>
             <a:r>
-              <a:rPr lang="en-US" sz="1050" dirty="0" smtClean="0">
+              <a:rPr lang="en-US" sz="1050" dirty="0">
                 <a:solidFill>
                   <a:schemeClr val="bg1"/>
                 </a:solidFill>
@@ -3721,61 +3856,6 @@
               <a:t>Storage</a:t>
             </a:r>
             <a:endParaRPr lang="en-SG" sz="1050" dirty="0">
-              <a:solidFill>
-                <a:schemeClr val="bg1"/>
-              </a:solidFill>
-            </a:endParaRPr>
-          </a:p>
-        </p:txBody>
-      </p:sp>
-      <p:sp>
-        <p:nvSpPr>
-          <p:cNvPr id="120" name="Isosceles Triangle 102"/>
-          <p:cNvSpPr/>
-          <p:nvPr/>
-        </p:nvSpPr>
-        <p:spPr>
-          <a:xfrm rot="16200000">
-            <a:off x="1626910" y="2952291"/>
-            <a:ext cx="270504" cy="175523"/>
-          </a:xfrm>
-          <a:prstGeom prst="triangle">
-            <a:avLst/>
-          </a:prstGeom>
-          <a:solidFill>
-            <a:schemeClr val="accent6">
-              <a:lumMod val="75000"/>
-            </a:schemeClr>
-          </a:solidFill>
-          <a:ln w="19050">
-            <a:solidFill>
-              <a:schemeClr val="accent6">
-                <a:lumMod val="75000"/>
-              </a:schemeClr>
-            </a:solidFill>
-          </a:ln>
-          <a:effectLst/>
-        </p:spPr>
-        <p:style>
-          <a:lnRef idx="1">
-            <a:schemeClr val="accent2"/>
-          </a:lnRef>
-          <a:fillRef idx="2">
-            <a:schemeClr val="accent2"/>
-          </a:fillRef>
-          <a:effectRef idx="1">
-            <a:schemeClr val="accent2"/>
-          </a:effectRef>
-          <a:fontRef idx="minor">
-            <a:schemeClr val="dk1"/>
-          </a:fontRef>
-        </p:style>
-        <p:txBody>
-          <a:bodyPr rtlCol="0" anchor="ctr"/>
-          <a:lstStyle/>
-          <a:p>
-            <a:pPr algn="ctr"/>
-            <a:endParaRPr lang="en-SG" sz="1050">
               <a:solidFill>
                 <a:schemeClr val="bg1"/>
               </a:solidFill>
@@ -3869,49 +3949,125 @@
           </a:fontRef>
         </p:style>
       </p:cxnSp>
-      <p:cxnSp>
-        <p:nvCxnSpPr>
-          <p:cNvPr id="21" name="Straight Connector 20"/>
-          <p:cNvCxnSpPr>
-            <a:stCxn id="120" idx="3"/>
-          </p:cNvCxnSpPr>
+      <p:grpSp>
+        <p:nvGrpSpPr>
+          <p:cNvPr id="3" name="Group 2">
+            <a:extLst>
+              <a:ext uri="{FF2B5EF4-FFF2-40B4-BE49-F238E27FC236}">
+                <a16:creationId xmlns:a16="http://schemas.microsoft.com/office/drawing/2014/main" id="{CE02867F-B1C3-4BEA-9BFF-08D94FE4CC1E}"/>
+              </a:ext>
+            </a:extLst>
+          </p:cNvPr>
+          <p:cNvGrpSpPr/>
           <p:nvPr/>
-        </p:nvCxnSpPr>
-        <p:spPr>
-          <a:xfrm flipV="1">
-            <a:off x="1849924" y="3040052"/>
-            <a:ext cx="216105" cy="1"/>
+        </p:nvGrpSpPr>
+        <p:grpSpPr>
+          <a:xfrm>
+            <a:off x="1679823" y="3258546"/>
+            <a:ext cx="391629" cy="270504"/>
+            <a:chOff x="1674400" y="2904801"/>
+            <a:chExt cx="391629" cy="270504"/>
           </a:xfrm>
-          <a:prstGeom prst="line">
-            <a:avLst/>
-          </a:prstGeom>
-          <a:ln w="19050">
+        </p:grpSpPr>
+        <p:sp>
+          <p:nvSpPr>
+            <p:cNvPr id="120" name="Isosceles Triangle 102"/>
+            <p:cNvSpPr/>
+            <p:nvPr/>
+          </p:nvSpPr>
+          <p:spPr>
+            <a:xfrm rot="16200000">
+              <a:off x="1626910" y="2952291"/>
+              <a:ext cx="270504" cy="175523"/>
+            </a:xfrm>
+            <a:prstGeom prst="triangle">
+              <a:avLst/>
+            </a:prstGeom>
             <a:solidFill>
               <a:schemeClr val="accent6">
                 <a:lumMod val="75000"/>
               </a:schemeClr>
             </a:solidFill>
-            <a:prstDash val="sysDot"/>
-            <a:headEnd type="none" w="med" len="med"/>
-            <a:tailEnd type="none" w="med" len="med"/>
-          </a:ln>
-          <a:effectLst/>
-        </p:spPr>
-        <p:style>
-          <a:lnRef idx="1">
-            <a:schemeClr val="accent2"/>
-          </a:lnRef>
-          <a:fillRef idx="2">
-            <a:schemeClr val="accent2"/>
-          </a:fillRef>
-          <a:effectRef idx="1">
-            <a:schemeClr val="accent2"/>
-          </a:effectRef>
-          <a:fontRef idx="minor">
-            <a:schemeClr val="dk1"/>
-          </a:fontRef>
-        </p:style>
-      </p:cxnSp>
+            <a:ln w="19050">
+              <a:solidFill>
+                <a:schemeClr val="accent6">
+                  <a:lumMod val="75000"/>
+                </a:schemeClr>
+              </a:solidFill>
+            </a:ln>
+            <a:effectLst/>
+          </p:spPr>
+          <p:style>
+            <a:lnRef idx="1">
+              <a:schemeClr val="accent2"/>
+            </a:lnRef>
+            <a:fillRef idx="2">
+              <a:schemeClr val="accent2"/>
+            </a:fillRef>
+            <a:effectRef idx="1">
+              <a:schemeClr val="accent2"/>
+            </a:effectRef>
+            <a:fontRef idx="minor">
+              <a:schemeClr val="dk1"/>
+            </a:fontRef>
+          </p:style>
+          <p:txBody>
+            <a:bodyPr rtlCol="0" anchor="ctr"/>
+            <a:lstStyle/>
+            <a:p>
+              <a:pPr algn="ctr"/>
+              <a:endParaRPr lang="en-SG" sz="1050">
+                <a:solidFill>
+                  <a:schemeClr val="bg1"/>
+                </a:solidFill>
+              </a:endParaRPr>
+            </a:p>
+          </p:txBody>
+        </p:sp>
+        <p:cxnSp>
+          <p:nvCxnSpPr>
+            <p:cNvPr id="21" name="Straight Connector 20"/>
+            <p:cNvCxnSpPr>
+              <a:stCxn id="120" idx="3"/>
+            </p:cNvCxnSpPr>
+            <p:nvPr/>
+          </p:nvCxnSpPr>
+          <p:spPr>
+            <a:xfrm flipV="1">
+              <a:off x="1849924" y="3040052"/>
+              <a:ext cx="216105" cy="1"/>
+            </a:xfrm>
+            <a:prstGeom prst="line">
+              <a:avLst/>
+            </a:prstGeom>
+            <a:ln w="19050">
+              <a:solidFill>
+                <a:schemeClr val="accent6">
+                  <a:lumMod val="75000"/>
+                </a:schemeClr>
+              </a:solidFill>
+              <a:prstDash val="sysDot"/>
+              <a:headEnd type="none" w="med" len="med"/>
+              <a:tailEnd type="none" w="med" len="med"/>
+            </a:ln>
+            <a:effectLst/>
+          </p:spPr>
+          <p:style>
+            <a:lnRef idx="1">
+              <a:schemeClr val="accent2"/>
+            </a:lnRef>
+            <a:fillRef idx="2">
+              <a:schemeClr val="accent2"/>
+            </a:fillRef>
+            <a:effectRef idx="1">
+              <a:schemeClr val="accent2"/>
+            </a:effectRef>
+            <a:fontRef idx="minor">
+              <a:schemeClr val="dk1"/>
+            </a:fontRef>
+          </p:style>
+        </p:cxnSp>
+      </p:grpSp>
       <p:sp>
         <p:nvSpPr>
           <p:cNvPr id="42" name="Flowchart: Decision 96"/>
@@ -4147,7 +4303,7 @@
           <a:p>
             <a:pPr algn="ctr"/>
             <a:r>
-              <a:rPr lang="en-US" sz="1050" b="1" dirty="0" err="1" smtClean="0">
+              <a:rPr lang="en-US" sz="1050" b="1" dirty="0" err="1">
                 <a:solidFill>
                   <a:schemeClr val="accent6">
                     <a:lumMod val="75000"/>
@@ -4156,18 +4312,8 @@
               </a:rPr>
               <a:t>XmlAddressBook</a:t>
             </a:r>
-            <a:r>
-              <a:rPr lang="en-US" sz="1050" b="1" dirty="0" smtClean="0">
-                <a:solidFill>
-                  <a:schemeClr val="accent6">
-                    <a:lumMod val="75000"/>
-                  </a:schemeClr>
-                </a:solidFill>
-              </a:rPr>
-              <a:t/>
-            </a:r>
             <a:br>
-              <a:rPr lang="en-US" sz="1050" b="1" dirty="0" smtClean="0">
+              <a:rPr lang="en-US" sz="1050" b="1" dirty="0">
                 <a:solidFill>
                   <a:schemeClr val="accent6">
                     <a:lumMod val="75000"/>
@@ -4176,7 +4322,7 @@
               </a:rPr>
             </a:br>
             <a:r>
-              <a:rPr lang="en-US" sz="1050" b="1" dirty="0" smtClean="0">
+              <a:rPr lang="en-US" sz="1050" b="1" dirty="0">
                 <a:solidFill>
                   <a:schemeClr val="accent6">
                     <a:lumMod val="75000"/>
@@ -4243,7 +4389,7 @@
           <a:p>
             <a:pPr algn="ctr"/>
             <a:r>
-              <a:rPr lang="en-US" sz="1050" dirty="0" smtClean="0">
+              <a:rPr lang="en-US" sz="1050" dirty="0">
                 <a:solidFill>
                   <a:schemeClr val="bg1"/>
                 </a:solidFill>
@@ -4251,14 +4397,14 @@
               <a:t>&lt;&lt;interface&gt;&gt;</a:t>
             </a:r>
             <a:br>
-              <a:rPr lang="en-US" sz="1050" dirty="0" smtClean="0">
+              <a:rPr lang="en-US" sz="1050" dirty="0">
                 <a:solidFill>
                   <a:schemeClr val="bg1"/>
                 </a:solidFill>
               </a:rPr>
             </a:br>
             <a:r>
-              <a:rPr lang="en-US" sz="1050" dirty="0" err="1" smtClean="0">
+              <a:rPr lang="en-US" sz="1050" dirty="0" err="1">
                 <a:solidFill>
                   <a:schemeClr val="bg1"/>
                 </a:solidFill>
@@ -4516,30 +4662,22 @@
           <a:p>
             <a:pPr algn="ctr"/>
             <a:r>
-              <a:rPr lang="en-US" sz="1050" dirty="0" err="1" smtClean="0">
+              <a:rPr lang="en-US" sz="1050" dirty="0" err="1">
                 <a:solidFill>
                   <a:schemeClr val="bg1"/>
                 </a:solidFill>
               </a:rPr>
               <a:t>JsonUserPrefs</a:t>
             </a:r>
-            <a:r>
-              <a:rPr lang="en-US" sz="1050" dirty="0" smtClean="0">
-                <a:solidFill>
-                  <a:schemeClr val="bg1"/>
-                </a:solidFill>
-              </a:rPr>
-              <a:t/>
-            </a:r>
             <a:br>
-              <a:rPr lang="en-US" sz="1050" dirty="0" smtClean="0">
+              <a:rPr lang="en-US" sz="1050" dirty="0">
                 <a:solidFill>
                   <a:schemeClr val="bg1"/>
                 </a:solidFill>
               </a:rPr>
             </a:br>
             <a:r>
-              <a:rPr lang="en-US" sz="1050" dirty="0" smtClean="0">
+              <a:rPr lang="en-US" sz="1050" dirty="0">
                 <a:solidFill>
                   <a:schemeClr val="bg1"/>
                 </a:solidFill>
@@ -4591,7 +4729,7 @@
           <a:p>
             <a:pPr algn="ctr"/>
             <a:r>
-              <a:rPr lang="en-US" sz="1050" b="1" dirty="0" err="1" smtClean="0">
+              <a:rPr lang="en-US" sz="1050" b="1" dirty="0" err="1">
                 <a:solidFill>
                   <a:schemeClr val="accent6">
                     <a:lumMod val="75000"/>
@@ -4600,18 +4738,8 @@
               </a:rPr>
               <a:t>XmlSerializable</a:t>
             </a:r>
-            <a:r>
-              <a:rPr lang="en-US" sz="1050" b="1" dirty="0" smtClean="0">
-                <a:solidFill>
-                  <a:schemeClr val="accent6">
-                    <a:lumMod val="75000"/>
-                  </a:schemeClr>
-                </a:solidFill>
-              </a:rPr>
-              <a:t/>
-            </a:r>
             <a:br>
-              <a:rPr lang="en-US" sz="1050" b="1" dirty="0" smtClean="0">
+              <a:rPr lang="en-US" sz="1050" b="1" dirty="0">
                 <a:solidFill>
                   <a:schemeClr val="accent6">
                     <a:lumMod val="75000"/>
@@ -4620,7 +4748,7 @@
               </a:rPr>
             </a:br>
             <a:r>
-              <a:rPr lang="en-US" sz="1050" b="1" dirty="0" err="1" smtClean="0">
+              <a:rPr lang="en-US" sz="1050" b="1" dirty="0" err="1">
                 <a:solidFill>
                   <a:schemeClr val="accent6">
                     <a:lumMod val="75000"/>
@@ -4717,7 +4845,7 @@
           <a:p>
             <a:pPr algn="ctr"/>
             <a:r>
-              <a:rPr lang="en-US" sz="1050" b="1" dirty="0" err="1" smtClean="0">
+              <a:rPr lang="en-US" sz="1050" b="1" dirty="0" err="1">
                 <a:solidFill>
                   <a:schemeClr val="accent6">
                     <a:lumMod val="75000"/>
@@ -4773,7 +4901,7 @@
           <a:p>
             <a:pPr algn="ctr"/>
             <a:r>
-              <a:rPr lang="en-US" sz="1050" b="1" dirty="0" err="1" smtClean="0">
+              <a:rPr lang="en-US" sz="1050" b="1" dirty="0" err="1">
                 <a:solidFill>
                   <a:schemeClr val="accent6">
                     <a:lumMod val="75000"/>
@@ -4833,6 +4961,266 @@
           </a:fontRef>
         </p:style>
       </p:cxnSp>
+      <p:grpSp>
+        <p:nvGrpSpPr>
+          <p:cNvPr id="4" name="Group 3">
+            <a:extLst>
+              <a:ext uri="{FF2B5EF4-FFF2-40B4-BE49-F238E27FC236}">
+                <a16:creationId xmlns:a16="http://schemas.microsoft.com/office/drawing/2014/main" id="{3FEF5B98-D3DD-4A37-9AAA-BE6F265ED468}"/>
+              </a:ext>
+            </a:extLst>
+          </p:cNvPr>
+          <p:cNvGrpSpPr/>
+          <p:nvPr/>
+        </p:nvGrpSpPr>
+        <p:grpSpPr>
+          <a:xfrm>
+            <a:off x="2420001" y="3871795"/>
+            <a:ext cx="456858" cy="173380"/>
+            <a:chOff x="2420001" y="3871795"/>
+            <a:chExt cx="456858" cy="173380"/>
+          </a:xfrm>
+        </p:grpSpPr>
+        <p:cxnSp>
+          <p:nvCxnSpPr>
+            <p:cNvPr id="26" name="Straight Arrow Connector 25">
+              <a:extLst>
+                <a:ext uri="{FF2B5EF4-FFF2-40B4-BE49-F238E27FC236}">
+                  <a16:creationId xmlns:a16="http://schemas.microsoft.com/office/drawing/2014/main" id="{A2AB4250-FF21-406B-98CC-8CD1CCEC2E0E}"/>
+                </a:ext>
+              </a:extLst>
+            </p:cNvPr>
+            <p:cNvCxnSpPr>
+              <a:stCxn id="27" idx="3"/>
+            </p:cNvCxnSpPr>
+            <p:nvPr/>
+          </p:nvCxnSpPr>
+          <p:spPr>
+            <a:xfrm>
+              <a:off x="2656049" y="3958485"/>
+              <a:ext cx="220810" cy="5284"/>
+            </a:xfrm>
+            <a:prstGeom prst="straightConnector1">
+              <a:avLst/>
+            </a:prstGeom>
+            <a:ln w="19050">
+              <a:solidFill>
+                <a:schemeClr val="accent6">
+                  <a:lumMod val="75000"/>
+                </a:schemeClr>
+              </a:solidFill>
+              <a:headEnd type="none" w="med" len="med"/>
+              <a:tailEnd type="arrow" w="med" len="med"/>
+            </a:ln>
+            <a:effectLst/>
+          </p:spPr>
+          <p:style>
+            <a:lnRef idx="1">
+              <a:schemeClr val="accent2"/>
+            </a:lnRef>
+            <a:fillRef idx="2">
+              <a:schemeClr val="accent2"/>
+            </a:fillRef>
+            <a:effectRef idx="1">
+              <a:schemeClr val="accent2"/>
+            </a:effectRef>
+            <a:fontRef idx="minor">
+              <a:schemeClr val="dk1"/>
+            </a:fontRef>
+          </p:style>
+        </p:cxnSp>
+        <p:sp>
+          <p:nvSpPr>
+            <p:cNvPr id="27" name="Flowchart: Decision 96">
+              <a:extLst>
+                <a:ext uri="{FF2B5EF4-FFF2-40B4-BE49-F238E27FC236}">
+                  <a16:creationId xmlns:a16="http://schemas.microsoft.com/office/drawing/2014/main" id="{1CB1A82D-B7B9-4751-B844-172526D6A2BB}"/>
+                </a:ext>
+              </a:extLst>
+            </p:cNvPr>
+            <p:cNvSpPr/>
+            <p:nvPr/>
+          </p:nvSpPr>
+          <p:spPr>
+            <a:xfrm>
+              <a:off x="2420001" y="3871795"/>
+              <a:ext cx="236048" cy="173380"/>
+            </a:xfrm>
+            <a:prstGeom prst="flowChartDecision">
+              <a:avLst/>
+            </a:prstGeom>
+            <a:noFill/>
+            <a:ln w="19050">
+              <a:solidFill>
+                <a:schemeClr val="accent6">
+                  <a:lumMod val="75000"/>
+                </a:schemeClr>
+              </a:solidFill>
+            </a:ln>
+            <a:effectLst/>
+          </p:spPr>
+          <p:style>
+            <a:lnRef idx="1">
+              <a:schemeClr val="accent2"/>
+            </a:lnRef>
+            <a:fillRef idx="2">
+              <a:schemeClr val="accent2"/>
+            </a:fillRef>
+            <a:effectRef idx="1">
+              <a:schemeClr val="accent2"/>
+            </a:effectRef>
+            <a:fontRef idx="minor">
+              <a:schemeClr val="dk1"/>
+            </a:fontRef>
+          </p:style>
+          <p:txBody>
+            <a:bodyPr rtlCol="0" anchor="ctr"/>
+            <a:lstStyle/>
+            <a:p>
+              <a:pPr algn="ctr"/>
+              <a:endParaRPr lang="en-US" sz="1050">
+                <a:solidFill>
+                  <a:schemeClr val="bg1"/>
+                </a:solidFill>
+              </a:endParaRPr>
+            </a:p>
+          </p:txBody>
+        </p:sp>
+      </p:grpSp>
+      <p:sp>
+        <p:nvSpPr>
+          <p:cNvPr id="32" name="Rectangle 8">
+            <a:extLst>
+              <a:ext uri="{FF2B5EF4-FFF2-40B4-BE49-F238E27FC236}">
+                <a16:creationId xmlns:a16="http://schemas.microsoft.com/office/drawing/2014/main" id="{A2F02829-0356-4FB8-9CE0-B88093B4E8AF}"/>
+              </a:ext>
+            </a:extLst>
+          </p:cNvPr>
+          <p:cNvSpPr/>
+          <p:nvPr/>
+        </p:nvSpPr>
+        <p:spPr>
+          <a:xfrm>
+            <a:off x="2873943" y="3807012"/>
+            <a:ext cx="1323049" cy="346760"/>
+          </a:xfrm>
+          <a:prstGeom prst="rect">
+            <a:avLst/>
+          </a:prstGeom>
+          <a:solidFill>
+            <a:schemeClr val="accent6">
+              <a:lumMod val="75000"/>
+            </a:schemeClr>
+          </a:solidFill>
+          <a:ln w="19050">
+            <a:solidFill>
+              <a:schemeClr val="accent6">
+                <a:lumMod val="75000"/>
+              </a:schemeClr>
+            </a:solidFill>
+          </a:ln>
+          <a:effectLst/>
+        </p:spPr>
+        <p:style>
+          <a:lnRef idx="1">
+            <a:schemeClr val="accent2"/>
+          </a:lnRef>
+          <a:fillRef idx="2">
+            <a:schemeClr val="accent2"/>
+          </a:fillRef>
+          <a:effectRef idx="1">
+            <a:schemeClr val="accent2"/>
+          </a:effectRef>
+          <a:fontRef idx="minor">
+            <a:schemeClr val="dk1"/>
+          </a:fontRef>
+        </p:style>
+        <p:txBody>
+          <a:bodyPr rtlCol="0" anchor="ctr"/>
+          <a:lstStyle/>
+          <a:p>
+            <a:pPr algn="ctr"/>
+            <a:r>
+              <a:rPr lang="en-US" sz="1050" dirty="0">
+                <a:solidFill>
+                  <a:schemeClr val="bg1"/>
+                </a:solidFill>
+              </a:rPr>
+              <a:t>&lt;&lt;interface&gt;&gt;</a:t>
+            </a:r>
+            <a:br>
+              <a:rPr lang="en-US" sz="1050" dirty="0">
+                <a:solidFill>
+                  <a:schemeClr val="bg1"/>
+                </a:solidFill>
+              </a:rPr>
+            </a:br>
+            <a:r>
+              <a:rPr lang="en-US" sz="1050" dirty="0" err="1">
+                <a:solidFill>
+                  <a:schemeClr val="bg1"/>
+                </a:solidFill>
+              </a:rPr>
+              <a:t>ImportExportStorage</a:t>
+            </a:r>
+            <a:endParaRPr lang="en-SG" sz="1050" dirty="0">
+              <a:solidFill>
+                <a:schemeClr val="bg1"/>
+              </a:solidFill>
+            </a:endParaRPr>
+          </a:p>
+        </p:txBody>
+      </p:sp>
+      <p:cxnSp>
+        <p:nvCxnSpPr>
+          <p:cNvPr id="33" name="Elbow Connector 63">
+            <a:extLst>
+              <a:ext uri="{FF2B5EF4-FFF2-40B4-BE49-F238E27FC236}">
+                <a16:creationId xmlns:a16="http://schemas.microsoft.com/office/drawing/2014/main" id="{95B6788E-D3FA-4B57-A044-3E5CE08D4084}"/>
+              </a:ext>
+            </a:extLst>
+          </p:cNvPr>
+          <p:cNvCxnSpPr>
+            <a:cxnSpLocks/>
+            <a:endCxn id="50" idx="2"/>
+          </p:cNvCxnSpPr>
+          <p:nvPr/>
+        </p:nvCxnSpPr>
+        <p:spPr>
+          <a:xfrm flipV="1">
+            <a:off x="4212007" y="3505200"/>
+            <a:ext cx="994276" cy="448004"/>
+          </a:xfrm>
+          <a:prstGeom prst="bentConnector2">
+            <a:avLst/>
+          </a:prstGeom>
+          <a:ln w="19050">
+            <a:solidFill>
+              <a:schemeClr val="accent6">
+                <a:lumMod val="75000"/>
+              </a:schemeClr>
+            </a:solidFill>
+            <a:prstDash val="sysDot"/>
+            <a:headEnd type="none" w="med" len="med"/>
+            <a:tailEnd type="arrow" w="med" len="med"/>
+          </a:ln>
+          <a:effectLst/>
+        </p:spPr>
+        <p:style>
+          <a:lnRef idx="1">
+            <a:schemeClr val="accent2"/>
+          </a:lnRef>
+          <a:fillRef idx="2">
+            <a:schemeClr val="accent2"/>
+          </a:fillRef>
+          <a:effectRef idx="1">
+            <a:schemeClr val="accent2"/>
+          </a:effectRef>
+          <a:fontRef idx="minor">
+            <a:schemeClr val="dk1"/>
+          </a:fontRef>
+        </p:style>
+      </p:cxnSp>
     </p:spTree>
     <p:extLst>
       <p:ext uri="{BB962C8B-B14F-4D97-AF65-F5344CB8AC3E}">
@@ -4843,13 +5231,6 @@
   <p:clrMapOvr>
     <a:masterClrMapping/>
   </p:clrMapOvr>
-  <p:timing>
-    <p:tnLst>
-      <p:par>
-        <p:cTn id="1" dur="indefinite" restart="never" nodeType="tmRoot"/>
-      </p:par>
-    </p:tnLst>
-  </p:timing>
 </p:sld>
 </file>
 

</xml_diff>

<commit_message>
Update Developer Guide for Sijie's Import/Export
</commit_message>
<xml_diff>
--- a/docs/diagrams/StorageComponentClassDiagram.pptx
+++ b/docs/diagrams/StorageComponentClassDiagram.pptx
@@ -10,7 +10,7 @@
   <p:sldIdLst>
     <p:sldId id="264" r:id="rId2"/>
   </p:sldIdLst>
-  <p:sldSz cx="9144000" cy="6858000" type="screen4x3"/>
+  <p:sldSz cx="12192000" cy="6858000"/>
   <p:notesSz cx="6858000" cy="9144000"/>
   <p:defaultTextStyle>
     <a:defPPr>
@@ -110,12 +110,12 @@
   <p:extLst>
     <p:ext uri="{EFAFB233-063F-42B5-8137-9DF3F51BA10A}">
       <p15:sldGuideLst xmlns:p15="http://schemas.microsoft.com/office/powerpoint/2012/main">
-        <p15:guide id="1" orient="horz" pos="1488">
+        <p15:guide id="1" orient="horz" pos="1488" userDrawn="1">
           <p15:clr>
             <a:srgbClr val="A4A3A4"/>
           </p15:clr>
         </p15:guide>
-        <p15:guide id="2" pos="2880">
+        <p15:guide id="2" pos="3840" userDrawn="1">
           <p15:clr>
             <a:srgbClr val="A4A3A4"/>
           </p15:clr>
@@ -349,7 +349,7 @@
           <a:p>
             <a:fld id="{F5CC4B3F-88C1-4FFA-B1B6-F41C21DC6924}" type="datetimeFigureOut">
               <a:rPr lang="en-US" smtClean="0"/>
-              <a:t>10/19/2018</a:t>
+              <a:t>10-Nov-18</a:t>
             </a:fld>
             <a:endParaRPr lang="en-US"/>
           </a:p>
@@ -367,8 +367,8 @@
         </p:nvSpPr>
         <p:spPr>
           <a:xfrm>
-            <a:off x="1143000" y="685800"/>
-            <a:ext cx="4572000" cy="3429000"/>
+            <a:off x="381000" y="685800"/>
+            <a:ext cx="6096000" cy="3429000"/>
           </a:xfrm>
           <a:prstGeom prst="rect">
             <a:avLst/>
@@ -645,8 +645,8 @@
         </p:nvSpPr>
         <p:spPr>
           <a:xfrm>
-            <a:off x="685800" y="2130425"/>
-            <a:ext cx="7772400" cy="1470025"/>
+            <a:off x="914400" y="2130426"/>
+            <a:ext cx="10363200" cy="1470025"/>
           </a:xfrm>
         </p:spPr>
         <p:txBody>
@@ -672,8 +672,8 @@
         </p:nvSpPr>
         <p:spPr>
           <a:xfrm>
-            <a:off x="1371600" y="3886200"/>
-            <a:ext cx="6400800" cy="1752600"/>
+            <a:off x="1828800" y="3886200"/>
+            <a:ext cx="8534400" cy="1752600"/>
           </a:xfrm>
         </p:spPr>
         <p:txBody>
@@ -795,7 +795,7 @@
           <a:p>
             <a:fld id="{78C97017-6FC3-485B-9764-EAC9E56C1D49}" type="datetimeFigureOut">
               <a:rPr lang="en-US" smtClean="0"/>
-              <a:t>10/19/2018</a:t>
+              <a:t>10-Nov-18</a:t>
             </a:fld>
             <a:endParaRPr lang="en-US"/>
           </a:p>
@@ -963,7 +963,7 @@
           <a:p>
             <a:fld id="{78C97017-6FC3-485B-9764-EAC9E56C1D49}" type="datetimeFigureOut">
               <a:rPr lang="en-US" smtClean="0"/>
-              <a:t>10/19/2018</a:t>
+              <a:t>10-Nov-18</a:t>
             </a:fld>
             <a:endParaRPr lang="en-US"/>
           </a:p>
@@ -1053,8 +1053,8 @@
         </p:nvSpPr>
         <p:spPr>
           <a:xfrm>
-            <a:off x="6629400" y="274638"/>
-            <a:ext cx="2057400" cy="5851525"/>
+            <a:off x="8839200" y="274639"/>
+            <a:ext cx="2743200" cy="5851525"/>
           </a:xfrm>
         </p:spPr>
         <p:txBody>
@@ -1080,8 +1080,8 @@
         </p:nvSpPr>
         <p:spPr>
           <a:xfrm>
-            <a:off x="457200" y="274638"/>
-            <a:ext cx="6019800" cy="5851525"/>
+            <a:off x="609600" y="274639"/>
+            <a:ext cx="8026400" cy="5851525"/>
           </a:xfrm>
         </p:spPr>
         <p:txBody>
@@ -1141,7 +1141,7 @@
           <a:p>
             <a:fld id="{78C97017-6FC3-485B-9764-EAC9E56C1D49}" type="datetimeFigureOut">
               <a:rPr lang="en-US" smtClean="0"/>
-              <a:t>10/19/2018</a:t>
+              <a:t>10-Nov-18</a:t>
             </a:fld>
             <a:endParaRPr lang="en-US"/>
           </a:p>
@@ -1309,7 +1309,7 @@
           <a:p>
             <a:fld id="{78C97017-6FC3-485B-9764-EAC9E56C1D49}" type="datetimeFigureOut">
               <a:rPr lang="en-US" smtClean="0"/>
-              <a:t>10/19/2018</a:t>
+              <a:t>10-Nov-18</a:t>
             </a:fld>
             <a:endParaRPr lang="en-US"/>
           </a:p>
@@ -1399,8 +1399,8 @@
         </p:nvSpPr>
         <p:spPr>
           <a:xfrm>
-            <a:off x="722313" y="4406900"/>
-            <a:ext cx="7772400" cy="1362075"/>
+            <a:off x="963084" y="4406901"/>
+            <a:ext cx="10363200" cy="1362075"/>
           </a:xfrm>
         </p:spPr>
         <p:txBody>
@@ -1430,8 +1430,8 @@
         </p:nvSpPr>
         <p:spPr>
           <a:xfrm>
-            <a:off x="722313" y="2906713"/>
-            <a:ext cx="7772400" cy="1500187"/>
+            <a:off x="963084" y="2906713"/>
+            <a:ext cx="10363200" cy="1500187"/>
           </a:xfrm>
         </p:spPr>
         <p:txBody>
@@ -1554,7 +1554,7 @@
           <a:p>
             <a:fld id="{78C97017-6FC3-485B-9764-EAC9E56C1D49}" type="datetimeFigureOut">
               <a:rPr lang="en-US" smtClean="0"/>
-              <a:t>10/19/2018</a:t>
+              <a:t>10-Nov-18</a:t>
             </a:fld>
             <a:endParaRPr lang="en-US"/>
           </a:p>
@@ -1666,8 +1666,8 @@
         </p:nvSpPr>
         <p:spPr>
           <a:xfrm>
-            <a:off x="457200" y="1600200"/>
-            <a:ext cx="4038600" cy="4525963"/>
+            <a:off x="609600" y="1600201"/>
+            <a:ext cx="5384800" cy="4525963"/>
           </a:xfrm>
         </p:spPr>
         <p:txBody>
@@ -1750,8 +1750,8 @@
         </p:nvSpPr>
         <p:spPr>
           <a:xfrm>
-            <a:off x="4648200" y="1600200"/>
-            <a:ext cx="4038600" cy="4525963"/>
+            <a:off x="6197600" y="1600201"/>
+            <a:ext cx="5384800" cy="4525963"/>
           </a:xfrm>
         </p:spPr>
         <p:txBody>
@@ -1839,7 +1839,7 @@
           <a:p>
             <a:fld id="{78C97017-6FC3-485B-9764-EAC9E56C1D49}" type="datetimeFigureOut">
               <a:rPr lang="en-US" smtClean="0"/>
-              <a:t>10/19/2018</a:t>
+              <a:t>10-Nov-18</a:t>
             </a:fld>
             <a:endParaRPr lang="en-US"/>
           </a:p>
@@ -1955,8 +1955,8 @@
         </p:nvSpPr>
         <p:spPr>
           <a:xfrm>
-            <a:off x="457200" y="1535113"/>
-            <a:ext cx="4040188" cy="639762"/>
+            <a:off x="609600" y="1535113"/>
+            <a:ext cx="5386917" cy="639762"/>
           </a:xfrm>
         </p:spPr>
         <p:txBody>
@@ -2020,8 +2020,8 @@
         </p:nvSpPr>
         <p:spPr>
           <a:xfrm>
-            <a:off x="457200" y="2174875"/>
-            <a:ext cx="4040188" cy="3951288"/>
+            <a:off x="609600" y="2174875"/>
+            <a:ext cx="5386917" cy="3951288"/>
           </a:xfrm>
         </p:spPr>
         <p:txBody>
@@ -2104,8 +2104,8 @@
         </p:nvSpPr>
         <p:spPr>
           <a:xfrm>
-            <a:off x="4645025" y="1535113"/>
-            <a:ext cx="4041775" cy="639762"/>
+            <a:off x="6193368" y="1535113"/>
+            <a:ext cx="5389033" cy="639762"/>
           </a:xfrm>
         </p:spPr>
         <p:txBody>
@@ -2169,8 +2169,8 @@
         </p:nvSpPr>
         <p:spPr>
           <a:xfrm>
-            <a:off x="4645025" y="2174875"/>
-            <a:ext cx="4041775" cy="3951288"/>
+            <a:off x="6193368" y="2174875"/>
+            <a:ext cx="5389033" cy="3951288"/>
           </a:xfrm>
         </p:spPr>
         <p:txBody>
@@ -2258,7 +2258,7 @@
           <a:p>
             <a:fld id="{78C97017-6FC3-485B-9764-EAC9E56C1D49}" type="datetimeFigureOut">
               <a:rPr lang="en-US" smtClean="0"/>
-              <a:t>10/19/2018</a:t>
+              <a:t>10-Nov-18</a:t>
             </a:fld>
             <a:endParaRPr lang="en-US"/>
           </a:p>
@@ -2375,7 +2375,7 @@
           <a:p>
             <a:fld id="{78C97017-6FC3-485B-9764-EAC9E56C1D49}" type="datetimeFigureOut">
               <a:rPr lang="en-US" smtClean="0"/>
-              <a:t>10/19/2018</a:t>
+              <a:t>10-Nov-18</a:t>
             </a:fld>
             <a:endParaRPr lang="en-US"/>
           </a:p>
@@ -2470,7 +2470,7 @@
           <a:p>
             <a:fld id="{78C97017-6FC3-485B-9764-EAC9E56C1D49}" type="datetimeFigureOut">
               <a:rPr lang="en-US" smtClean="0"/>
-              <a:t>10/19/2018</a:t>
+              <a:t>10-Nov-18</a:t>
             </a:fld>
             <a:endParaRPr lang="en-US"/>
           </a:p>
@@ -2560,8 +2560,8 @@
         </p:nvSpPr>
         <p:spPr>
           <a:xfrm>
-            <a:off x="457200" y="273050"/>
-            <a:ext cx="3008313" cy="1162050"/>
+            <a:off x="609601" y="273050"/>
+            <a:ext cx="4011084" cy="1162050"/>
           </a:xfrm>
         </p:spPr>
         <p:txBody>
@@ -2591,8 +2591,8 @@
         </p:nvSpPr>
         <p:spPr>
           <a:xfrm>
-            <a:off x="3575050" y="273050"/>
-            <a:ext cx="5111750" cy="5853113"/>
+            <a:off x="4766733" y="273051"/>
+            <a:ext cx="6815667" cy="5853113"/>
           </a:xfrm>
         </p:spPr>
         <p:txBody>
@@ -2675,8 +2675,8 @@
         </p:nvSpPr>
         <p:spPr>
           <a:xfrm>
-            <a:off x="457200" y="1435100"/>
-            <a:ext cx="3008313" cy="4691063"/>
+            <a:off x="609601" y="1435101"/>
+            <a:ext cx="4011084" cy="4691063"/>
           </a:xfrm>
         </p:spPr>
         <p:txBody>
@@ -2745,7 +2745,7 @@
           <a:p>
             <a:fld id="{78C97017-6FC3-485B-9764-EAC9E56C1D49}" type="datetimeFigureOut">
               <a:rPr lang="en-US" smtClean="0"/>
-              <a:t>10/19/2018</a:t>
+              <a:t>10-Nov-18</a:t>
             </a:fld>
             <a:endParaRPr lang="en-US"/>
           </a:p>
@@ -2835,8 +2835,8 @@
         </p:nvSpPr>
         <p:spPr>
           <a:xfrm>
-            <a:off x="1792288" y="4800600"/>
-            <a:ext cx="5486400" cy="566738"/>
+            <a:off x="2389717" y="4800600"/>
+            <a:ext cx="7315200" cy="566738"/>
           </a:xfrm>
         </p:spPr>
         <p:txBody>
@@ -2866,8 +2866,8 @@
         </p:nvSpPr>
         <p:spPr>
           <a:xfrm>
-            <a:off x="1792288" y="612775"/>
-            <a:ext cx="5486400" cy="4114800"/>
+            <a:off x="2389717" y="612775"/>
+            <a:ext cx="7315200" cy="4114800"/>
           </a:xfrm>
         </p:spPr>
         <p:txBody>
@@ -2927,8 +2927,8 @@
         </p:nvSpPr>
         <p:spPr>
           <a:xfrm>
-            <a:off x="1792288" y="5367338"/>
-            <a:ext cx="5486400" cy="804862"/>
+            <a:off x="2389717" y="5367338"/>
+            <a:ext cx="7315200" cy="804862"/>
           </a:xfrm>
         </p:spPr>
         <p:txBody>
@@ -2997,7 +2997,7 @@
           <a:p>
             <a:fld id="{78C97017-6FC3-485B-9764-EAC9E56C1D49}" type="datetimeFigureOut">
               <a:rPr lang="en-US" smtClean="0"/>
-              <a:t>10/19/2018</a:t>
+              <a:t>10-Nov-18</a:t>
             </a:fld>
             <a:endParaRPr lang="en-US"/>
           </a:p>
@@ -3092,8 +3092,8 @@
         </p:nvSpPr>
         <p:spPr>
           <a:xfrm>
-            <a:off x="457200" y="274638"/>
-            <a:ext cx="8229600" cy="1143000"/>
+            <a:off x="609600" y="274638"/>
+            <a:ext cx="10972800" cy="1143000"/>
           </a:xfrm>
           <a:prstGeom prst="rect">
             <a:avLst/>
@@ -3124,8 +3124,8 @@
         </p:nvSpPr>
         <p:spPr>
           <a:xfrm>
-            <a:off x="457200" y="1600200"/>
-            <a:ext cx="8229600" cy="4525963"/>
+            <a:off x="609600" y="1600201"/>
+            <a:ext cx="10972800" cy="4525963"/>
           </a:xfrm>
           <a:prstGeom prst="rect">
             <a:avLst/>
@@ -3185,8 +3185,8 @@
         </p:nvSpPr>
         <p:spPr>
           <a:xfrm>
-            <a:off x="457200" y="6356350"/>
-            <a:ext cx="2133600" cy="365125"/>
+            <a:off x="609600" y="6356351"/>
+            <a:ext cx="2844800" cy="365125"/>
           </a:xfrm>
           <a:prstGeom prst="rect">
             <a:avLst/>
@@ -3208,7 +3208,7 @@
           <a:p>
             <a:fld id="{78C97017-6FC3-485B-9764-EAC9E56C1D49}" type="datetimeFigureOut">
               <a:rPr lang="en-US" smtClean="0"/>
-              <a:t>10/19/2018</a:t>
+              <a:t>10-Nov-18</a:t>
             </a:fld>
             <a:endParaRPr lang="en-US"/>
           </a:p>
@@ -3226,8 +3226,8 @@
         </p:nvSpPr>
         <p:spPr>
           <a:xfrm>
-            <a:off x="3124200" y="6356350"/>
-            <a:ext cx="2895600" cy="365125"/>
+            <a:off x="4165600" y="6356351"/>
+            <a:ext cx="3860800" cy="365125"/>
           </a:xfrm>
           <a:prstGeom prst="rect">
             <a:avLst/>
@@ -3263,8 +3263,8 @@
         </p:nvSpPr>
         <p:spPr>
           <a:xfrm>
-            <a:off x="6553200" y="6356350"/>
-            <a:ext cx="2133600" cy="365125"/>
+            <a:off x="8737600" y="6356351"/>
+            <a:ext cx="2844800" cy="365125"/>
           </a:xfrm>
           <a:prstGeom prst="rect">
             <a:avLst/>
@@ -3591,8 +3591,8 @@
         </p:nvSpPr>
         <p:spPr>
           <a:xfrm>
-            <a:off x="1143000" y="2120038"/>
-            <a:ext cx="7871735" cy="2547518"/>
+            <a:off x="119403" y="1276593"/>
+            <a:ext cx="11658600" cy="3233318"/>
           </a:xfrm>
           <a:prstGeom prst="roundRect">
             <a:avLst>
@@ -3629,7 +3629,7 @@
           <a:lstStyle/>
           <a:p>
             <a:r>
-              <a:rPr lang="en-US" sz="1200" b="1" dirty="0">
+              <a:rPr lang="en-US" sz="1200" b="1" dirty="0" smtClean="0">
                 <a:solidFill>
                   <a:schemeClr val="accent6">
                     <a:lumMod val="75000"/>
@@ -3656,8 +3656,8 @@
         </p:nvSpPr>
         <p:spPr>
           <a:xfrm>
-            <a:off x="2914100" y="3153156"/>
-            <a:ext cx="1323049" cy="346760"/>
+            <a:off x="2004009" y="2514919"/>
+            <a:ext cx="1429300" cy="726545"/>
           </a:xfrm>
           <a:prstGeom prst="rect">
             <a:avLst/>
@@ -3716,7 +3716,7 @@
                   <a:schemeClr val="bg1"/>
                 </a:solidFill>
               </a:rPr>
-              <a:t>AddressBookStorage</a:t>
+              <a:t>TaskCollectionStorage</a:t>
             </a:r>
             <a:endParaRPr lang="en-SG" sz="1050" dirty="0">
               <a:solidFill>
@@ -3734,8 +3734,8 @@
         </p:nvSpPr>
         <p:spPr>
           <a:xfrm rot="16200000">
-            <a:off x="1306707" y="3245943"/>
-            <a:ext cx="1848148" cy="346760"/>
+            <a:off x="163316" y="2860246"/>
+            <a:ext cx="2314748" cy="346760"/>
           </a:xfrm>
           <a:prstGeom prst="rect">
             <a:avLst/>
@@ -3797,8 +3797,8 @@
         </p:nvSpPr>
         <p:spPr>
           <a:xfrm rot="16200000">
-            <a:off x="578946" y="3238458"/>
-            <a:ext cx="1848148" cy="346760"/>
+            <a:off x="-564445" y="2860246"/>
+            <a:ext cx="2314747" cy="346760"/>
           </a:xfrm>
           <a:prstGeom prst="rect">
             <a:avLst/>
@@ -3875,8 +3875,8 @@
         </p:nvCxnSpPr>
         <p:spPr>
           <a:xfrm>
-            <a:off x="2656370" y="3326536"/>
-            <a:ext cx="257730" cy="0"/>
+            <a:off x="1726440" y="2878191"/>
+            <a:ext cx="277569" cy="1"/>
           </a:xfrm>
           <a:prstGeom prst="straightConnector1">
             <a:avLst/>
@@ -3915,7 +3915,7 @@
         </p:nvCxnSpPr>
         <p:spPr>
           <a:xfrm>
-            <a:off x="910091" y="3040053"/>
+            <a:off x="0" y="2428542"/>
             <a:ext cx="419548" cy="2860"/>
           </a:xfrm>
           <a:prstGeom prst="bentConnector3">
@@ -3950,125 +3950,105 @@
           </a:fontRef>
         </p:style>
       </p:cxnSp>
-      <p:grpSp>
-        <p:nvGrpSpPr>
-          <p:cNvPr id="3" name="Group 2">
-            <a:extLst>
-              <a:ext uri="{FF2B5EF4-FFF2-40B4-BE49-F238E27FC236}">
-                <a16:creationId xmlns:a16="http://schemas.microsoft.com/office/drawing/2014/main" id="{CE02867F-B1C3-4BEA-9BFF-08D94FE4CC1E}"/>
-              </a:ext>
-            </a:extLst>
-          </p:cNvPr>
-          <p:cNvGrpSpPr/>
+      <p:sp>
+        <p:nvSpPr>
+          <p:cNvPr id="120" name="Isosceles Triangle 102"/>
+          <p:cNvSpPr/>
           <p:nvPr/>
-        </p:nvGrpSpPr>
-        <p:grpSpPr>
-          <a:xfrm>
-            <a:off x="1679823" y="3258546"/>
-            <a:ext cx="391629" cy="270504"/>
-            <a:chOff x="1674400" y="2904801"/>
-            <a:chExt cx="391629" cy="270504"/>
-          </a:xfrm>
-        </p:grpSpPr>
-        <p:sp>
-          <p:nvSpPr>
-            <p:cNvPr id="120" name="Isosceles Triangle 102"/>
-            <p:cNvSpPr/>
-            <p:nvPr/>
-          </p:nvSpPr>
-          <p:spPr>
-            <a:xfrm rot="16200000">
-              <a:off x="1626910" y="2952291"/>
-              <a:ext cx="270504" cy="175523"/>
-            </a:xfrm>
-            <a:prstGeom prst="triangle">
-              <a:avLst/>
-            </a:prstGeom>
+        </p:nvSpPr>
+        <p:spPr>
+          <a:xfrm rot="16200000">
+            <a:off x="746543" y="2946376"/>
+            <a:ext cx="270504" cy="175523"/>
+          </a:xfrm>
+          <a:prstGeom prst="triangle">
+            <a:avLst/>
+          </a:prstGeom>
+          <a:solidFill>
+            <a:schemeClr val="accent6">
+              <a:lumMod val="75000"/>
+            </a:schemeClr>
+          </a:solidFill>
+          <a:ln w="19050">
             <a:solidFill>
               <a:schemeClr val="accent6">
                 <a:lumMod val="75000"/>
               </a:schemeClr>
             </a:solidFill>
-            <a:ln w="19050">
+          </a:ln>
+          <a:effectLst/>
+        </p:spPr>
+        <p:style>
+          <a:lnRef idx="1">
+            <a:schemeClr val="accent2"/>
+          </a:lnRef>
+          <a:fillRef idx="2">
+            <a:schemeClr val="accent2"/>
+          </a:fillRef>
+          <a:effectRef idx="1">
+            <a:schemeClr val="accent2"/>
+          </a:effectRef>
+          <a:fontRef idx="minor">
+            <a:schemeClr val="dk1"/>
+          </a:fontRef>
+        </p:style>
+        <p:txBody>
+          <a:bodyPr rtlCol="0" anchor="ctr"/>
+          <a:lstStyle/>
+          <a:p>
+            <a:pPr algn="ctr"/>
+            <a:endParaRPr lang="en-SG" sz="1050">
               <a:solidFill>
-                <a:schemeClr val="accent6">
-                  <a:lumMod val="75000"/>
-                </a:schemeClr>
+                <a:schemeClr val="bg1"/>
               </a:solidFill>
-            </a:ln>
-            <a:effectLst/>
-          </p:spPr>
-          <p:style>
-            <a:lnRef idx="1">
-              <a:schemeClr val="accent2"/>
-            </a:lnRef>
-            <a:fillRef idx="2">
-              <a:schemeClr val="accent2"/>
-            </a:fillRef>
-            <a:effectRef idx="1">
-              <a:schemeClr val="accent2"/>
-            </a:effectRef>
-            <a:fontRef idx="minor">
-              <a:schemeClr val="dk1"/>
-            </a:fontRef>
-          </p:style>
-          <p:txBody>
-            <a:bodyPr rtlCol="0" anchor="ctr"/>
-            <a:lstStyle/>
-            <a:p>
-              <a:pPr algn="ctr"/>
-              <a:endParaRPr lang="en-SG" sz="1050">
-                <a:solidFill>
-                  <a:schemeClr val="bg1"/>
-                </a:solidFill>
-              </a:endParaRPr>
-            </a:p>
-          </p:txBody>
-        </p:sp>
-        <p:cxnSp>
-          <p:nvCxnSpPr>
-            <p:cNvPr id="21" name="Straight Connector 20"/>
-            <p:cNvCxnSpPr>
-              <a:stCxn id="120" idx="3"/>
-            </p:cNvCxnSpPr>
-            <p:nvPr/>
-          </p:nvCxnSpPr>
-          <p:spPr>
-            <a:xfrm flipV="1">
-              <a:off x="1849924" y="3040052"/>
-              <a:ext cx="216105" cy="1"/>
-            </a:xfrm>
-            <a:prstGeom prst="line">
-              <a:avLst/>
-            </a:prstGeom>
-            <a:ln w="19050">
-              <a:solidFill>
-                <a:schemeClr val="accent6">
-                  <a:lumMod val="75000"/>
-                </a:schemeClr>
-              </a:solidFill>
-              <a:prstDash val="sysDot"/>
-              <a:headEnd type="none" w="med" len="med"/>
-              <a:tailEnd type="none" w="med" len="med"/>
-            </a:ln>
-            <a:effectLst/>
-          </p:spPr>
-          <p:style>
-            <a:lnRef idx="1">
-              <a:schemeClr val="accent2"/>
-            </a:lnRef>
-            <a:fillRef idx="2">
-              <a:schemeClr val="accent2"/>
-            </a:fillRef>
-            <a:effectRef idx="1">
-              <a:schemeClr val="accent2"/>
-            </a:effectRef>
-            <a:fontRef idx="minor">
-              <a:schemeClr val="dk1"/>
-            </a:fontRef>
-          </p:style>
-        </p:cxnSp>
-      </p:grpSp>
+            </a:endParaRPr>
+          </a:p>
+        </p:txBody>
+      </p:sp>
+      <p:cxnSp>
+        <p:nvCxnSpPr>
+          <p:cNvPr id="21" name="Straight Connector 20"/>
+          <p:cNvCxnSpPr>
+            <a:stCxn id="120" idx="3"/>
+            <a:endCxn id="9" idx="0"/>
+          </p:cNvCxnSpPr>
+          <p:nvPr/>
+        </p:nvCxnSpPr>
+        <p:spPr>
+          <a:xfrm flipV="1">
+            <a:off x="969557" y="3033626"/>
+            <a:ext cx="177753" cy="512"/>
+          </a:xfrm>
+          <a:prstGeom prst="line">
+            <a:avLst/>
+          </a:prstGeom>
+          <a:ln w="19050">
+            <a:solidFill>
+              <a:schemeClr val="accent6">
+                <a:lumMod val="75000"/>
+              </a:schemeClr>
+            </a:solidFill>
+            <a:prstDash val="sysDot"/>
+            <a:headEnd type="none" w="med" len="med"/>
+            <a:tailEnd type="none" w="med" len="med"/>
+          </a:ln>
+          <a:effectLst/>
+        </p:spPr>
+        <p:style>
+          <a:lnRef idx="1">
+            <a:schemeClr val="accent2"/>
+          </a:lnRef>
+          <a:fillRef idx="2">
+            <a:schemeClr val="accent2"/>
+          </a:fillRef>
+          <a:effectRef idx="1">
+            <a:schemeClr val="accent2"/>
+          </a:effectRef>
+          <a:fontRef idx="minor">
+            <a:schemeClr val="dk1"/>
+          </a:fontRef>
+        </p:style>
+      </p:cxnSp>
       <p:sp>
         <p:nvSpPr>
           <p:cNvPr id="42" name="Flowchart: Decision 96"/>
@@ -4077,7 +4057,7 @@
         </p:nvSpPr>
         <p:spPr>
           <a:xfrm>
-            <a:off x="2420322" y="3239846"/>
+            <a:off x="1490392" y="2791501"/>
             <a:ext cx="236048" cy="173380"/>
           </a:xfrm>
           <a:prstGeom prst="flowChartDecision">
@@ -4122,17 +4102,320 @@
       </p:sp>
       <p:cxnSp>
         <p:nvCxnSpPr>
-          <p:cNvPr id="97" name="Elbow Connector 63"/>
+          <p:cNvPr id="124" name="Elbow Connector 122"/>
           <p:cNvCxnSpPr>
-            <a:stCxn id="99" idx="3"/>
-            <a:endCxn id="50" idx="1"/>
+            <a:stCxn id="50" idx="3"/>
+            <a:endCxn id="66" idx="1"/>
           </p:cNvCxnSpPr>
           <p:nvPr/>
         </p:nvCxnSpPr>
         <p:spPr>
           <a:xfrm flipV="1">
-            <a:off x="4398041" y="3331820"/>
-            <a:ext cx="223324" cy="1"/>
+            <a:off x="7423472" y="2356654"/>
+            <a:ext cx="359089" cy="2153"/>
+          </a:xfrm>
+          <a:prstGeom prst="bentConnector3">
+            <a:avLst>
+              <a:gd name="adj1" fmla="val 50000"/>
+            </a:avLst>
+          </a:prstGeom>
+          <a:ln w="19050">
+            <a:solidFill>
+              <a:schemeClr val="accent6">
+                <a:lumMod val="75000"/>
+              </a:schemeClr>
+            </a:solidFill>
+            <a:prstDash val="sysDot"/>
+            <a:headEnd type="none" w="med" len="med"/>
+            <a:tailEnd type="arrow" w="med" len="med"/>
+          </a:ln>
+          <a:effectLst/>
+        </p:spPr>
+        <p:style>
+          <a:lnRef idx="1">
+            <a:schemeClr val="accent2"/>
+          </a:lnRef>
+          <a:fillRef idx="2">
+            <a:schemeClr val="accent2"/>
+          </a:fillRef>
+          <a:effectRef idx="1">
+            <a:schemeClr val="accent2"/>
+          </a:effectRef>
+          <a:fontRef idx="minor">
+            <a:schemeClr val="dk1"/>
+          </a:fontRef>
+        </p:style>
+      </p:cxnSp>
+      <p:sp>
+        <p:nvSpPr>
+          <p:cNvPr id="50" name="Rectangle 8"/>
+          <p:cNvSpPr/>
+          <p:nvPr/>
+        </p:nvSpPr>
+        <p:spPr>
+          <a:xfrm>
+            <a:off x="6172200" y="2185427"/>
+            <a:ext cx="1251272" cy="346760"/>
+          </a:xfrm>
+          <a:prstGeom prst="rect">
+            <a:avLst/>
+          </a:prstGeom>
+          <a:ln w="19050"/>
+          <a:effectLst/>
+        </p:spPr>
+        <p:style>
+          <a:lnRef idx="1">
+            <a:schemeClr val="accent6"/>
+          </a:lnRef>
+          <a:fillRef idx="2">
+            <a:schemeClr val="accent6"/>
+          </a:fillRef>
+          <a:effectRef idx="1">
+            <a:schemeClr val="accent6"/>
+          </a:effectRef>
+          <a:fontRef idx="minor">
+            <a:schemeClr val="dk1"/>
+          </a:fontRef>
+        </p:style>
+        <p:txBody>
+          <a:bodyPr rtlCol="0" anchor="ctr"/>
+          <a:lstStyle/>
+          <a:p>
+            <a:pPr algn="ctr"/>
+            <a:r>
+              <a:rPr lang="en-US" sz="1050" b="1" dirty="0" err="1" smtClean="0">
+                <a:solidFill>
+                  <a:schemeClr val="accent6">
+                    <a:lumMod val="75000"/>
+                  </a:schemeClr>
+                </a:solidFill>
+              </a:rPr>
+              <a:t>XmlTaskCollection</a:t>
+            </a:r>
+            <a:r>
+              <a:rPr lang="en-US" sz="1050" b="1" dirty="0">
+                <a:solidFill>
+                  <a:schemeClr val="accent6">
+                    <a:lumMod val="75000"/>
+                  </a:schemeClr>
+                </a:solidFill>
+              </a:rPr>
+              <a:t/>
+            </a:r>
+            <a:br>
+              <a:rPr lang="en-US" sz="1050" b="1" dirty="0">
+                <a:solidFill>
+                  <a:schemeClr val="accent6">
+                    <a:lumMod val="75000"/>
+                  </a:schemeClr>
+                </a:solidFill>
+              </a:rPr>
+            </a:br>
+            <a:r>
+              <a:rPr lang="en-US" sz="1050" b="1" dirty="0">
+                <a:solidFill>
+                  <a:schemeClr val="accent6">
+                    <a:lumMod val="75000"/>
+                  </a:schemeClr>
+                </a:solidFill>
+              </a:rPr>
+              <a:t>Storage</a:t>
+            </a:r>
+            <a:endParaRPr lang="en-SG" sz="1050" b="1" dirty="0">
+              <a:solidFill>
+                <a:schemeClr val="accent6">
+                  <a:lumMod val="75000"/>
+                </a:schemeClr>
+              </a:solidFill>
+            </a:endParaRPr>
+          </a:p>
+        </p:txBody>
+      </p:sp>
+      <p:sp>
+        <p:nvSpPr>
+          <p:cNvPr id="52" name="Rectangle 8"/>
+          <p:cNvSpPr/>
+          <p:nvPr/>
+        </p:nvSpPr>
+        <p:spPr>
+          <a:xfrm>
+            <a:off x="1999655" y="1946529"/>
+            <a:ext cx="1433654" cy="346760"/>
+          </a:xfrm>
+          <a:prstGeom prst="rect">
+            <a:avLst/>
+          </a:prstGeom>
+          <a:solidFill>
+            <a:schemeClr val="accent6">
+              <a:lumMod val="75000"/>
+            </a:schemeClr>
+          </a:solidFill>
+          <a:ln w="19050">
+            <a:solidFill>
+              <a:schemeClr val="accent6">
+                <a:lumMod val="75000"/>
+              </a:schemeClr>
+            </a:solidFill>
+          </a:ln>
+          <a:effectLst/>
+        </p:spPr>
+        <p:style>
+          <a:lnRef idx="1">
+            <a:schemeClr val="accent2"/>
+          </a:lnRef>
+          <a:fillRef idx="2">
+            <a:schemeClr val="accent2"/>
+          </a:fillRef>
+          <a:effectRef idx="1">
+            <a:schemeClr val="accent2"/>
+          </a:effectRef>
+          <a:fontRef idx="minor">
+            <a:schemeClr val="dk1"/>
+          </a:fontRef>
+        </p:style>
+        <p:txBody>
+          <a:bodyPr rtlCol="0" anchor="ctr"/>
+          <a:lstStyle/>
+          <a:p>
+            <a:pPr algn="ctr"/>
+            <a:r>
+              <a:rPr lang="en-US" sz="1050" dirty="0">
+                <a:solidFill>
+                  <a:schemeClr val="bg1"/>
+                </a:solidFill>
+              </a:rPr>
+              <a:t>&lt;&lt;interface&gt;&gt;</a:t>
+            </a:r>
+            <a:br>
+              <a:rPr lang="en-US" sz="1050" dirty="0">
+                <a:solidFill>
+                  <a:schemeClr val="bg1"/>
+                </a:solidFill>
+              </a:rPr>
+            </a:br>
+            <a:r>
+              <a:rPr lang="en-US" sz="1050" dirty="0" err="1">
+                <a:solidFill>
+                  <a:schemeClr val="bg1"/>
+                </a:solidFill>
+              </a:rPr>
+              <a:t>UserPrefsStorage</a:t>
+            </a:r>
+            <a:endParaRPr lang="en-SG" sz="1050" dirty="0">
+              <a:solidFill>
+                <a:schemeClr val="bg1"/>
+              </a:solidFill>
+            </a:endParaRPr>
+          </a:p>
+        </p:txBody>
+      </p:sp>
+      <p:cxnSp>
+        <p:nvCxnSpPr>
+          <p:cNvPr id="54" name="Straight Arrow Connector 53"/>
+          <p:cNvCxnSpPr>
+            <a:stCxn id="56" idx="3"/>
+            <a:endCxn id="52" idx="1"/>
+          </p:cNvCxnSpPr>
+          <p:nvPr/>
+        </p:nvCxnSpPr>
+        <p:spPr>
+          <a:xfrm>
+            <a:off x="1743043" y="2114625"/>
+            <a:ext cx="256613" cy="5284"/>
+          </a:xfrm>
+          <a:prstGeom prst="straightConnector1">
+            <a:avLst/>
+          </a:prstGeom>
+          <a:ln w="19050">
+            <a:solidFill>
+              <a:schemeClr val="accent6">
+                <a:lumMod val="75000"/>
+              </a:schemeClr>
+            </a:solidFill>
+            <a:headEnd type="none" w="med" len="med"/>
+            <a:tailEnd type="arrow" w="med" len="med"/>
+          </a:ln>
+          <a:effectLst/>
+        </p:spPr>
+        <p:style>
+          <a:lnRef idx="1">
+            <a:schemeClr val="accent2"/>
+          </a:lnRef>
+          <a:fillRef idx="2">
+            <a:schemeClr val="accent2"/>
+          </a:fillRef>
+          <a:effectRef idx="1">
+            <a:schemeClr val="accent2"/>
+          </a:effectRef>
+          <a:fontRef idx="minor">
+            <a:schemeClr val="dk1"/>
+          </a:fontRef>
+        </p:style>
+      </p:cxnSp>
+      <p:sp>
+        <p:nvSpPr>
+          <p:cNvPr id="56" name="Flowchart: Decision 96"/>
+          <p:cNvSpPr/>
+          <p:nvPr/>
+        </p:nvSpPr>
+        <p:spPr>
+          <a:xfrm>
+            <a:off x="1506994" y="2027935"/>
+            <a:ext cx="236048" cy="173380"/>
+          </a:xfrm>
+          <a:prstGeom prst="flowChartDecision">
+            <a:avLst/>
+          </a:prstGeom>
+          <a:noFill/>
+          <a:ln w="19050">
+            <a:solidFill>
+              <a:schemeClr val="accent6">
+                <a:lumMod val="75000"/>
+              </a:schemeClr>
+            </a:solidFill>
+          </a:ln>
+          <a:effectLst/>
+        </p:spPr>
+        <p:style>
+          <a:lnRef idx="1">
+            <a:schemeClr val="accent2"/>
+          </a:lnRef>
+          <a:fillRef idx="2">
+            <a:schemeClr val="accent2"/>
+          </a:fillRef>
+          <a:effectRef idx="1">
+            <a:schemeClr val="accent2"/>
+          </a:effectRef>
+          <a:fontRef idx="minor">
+            <a:schemeClr val="dk1"/>
+          </a:fontRef>
+        </p:style>
+        <p:txBody>
+          <a:bodyPr rtlCol="0" anchor="ctr"/>
+          <a:lstStyle/>
+          <a:p>
+            <a:pPr algn="ctr"/>
+            <a:endParaRPr lang="en-US" sz="1050">
+              <a:solidFill>
+                <a:schemeClr val="bg1"/>
+              </a:solidFill>
+            </a:endParaRPr>
+          </a:p>
+        </p:txBody>
+      </p:sp>
+      <p:cxnSp>
+        <p:nvCxnSpPr>
+          <p:cNvPr id="60" name="Elbow Connector 63"/>
+          <p:cNvCxnSpPr>
+            <a:stCxn id="61" idx="3"/>
+            <a:endCxn id="65" idx="1"/>
+          </p:cNvCxnSpPr>
+          <p:nvPr/>
+        </p:nvCxnSpPr>
+        <p:spPr>
+          <a:xfrm flipV="1">
+            <a:off x="3610628" y="2119910"/>
+            <a:ext cx="397401" cy="2801"/>
           </a:xfrm>
           <a:prstGeom prst="bentConnector3">
             <a:avLst>
@@ -4168,13 +4451,13 @@
       </p:cxnSp>
       <p:sp>
         <p:nvSpPr>
-          <p:cNvPr id="99" name="Isosceles Triangle 102"/>
+          <p:cNvPr id="61" name="Isosceles Triangle 102"/>
           <p:cNvSpPr/>
           <p:nvPr/>
         </p:nvSpPr>
         <p:spPr>
           <a:xfrm rot="5400000" flipV="1">
-            <a:off x="4175027" y="3244059"/>
+            <a:off x="3387613" y="2034949"/>
             <a:ext cx="270504" cy="175523"/>
           </a:xfrm>
           <a:prstGeom prst="triangle">
@@ -4221,19 +4504,1461 @@
           </a:p>
         </p:txBody>
       </p:sp>
+      <p:sp>
+        <p:nvSpPr>
+          <p:cNvPr id="65" name="Rectangle 8"/>
+          <p:cNvSpPr/>
+          <p:nvPr/>
+        </p:nvSpPr>
+        <p:spPr>
+          <a:xfrm>
+            <a:off x="4008029" y="1946529"/>
+            <a:ext cx="1093635" cy="346760"/>
+          </a:xfrm>
+          <a:prstGeom prst="rect">
+            <a:avLst/>
+          </a:prstGeom>
+          <a:solidFill>
+            <a:schemeClr val="accent6">
+              <a:lumMod val="75000"/>
+            </a:schemeClr>
+          </a:solidFill>
+          <a:ln w="19050">
+            <a:solidFill>
+              <a:schemeClr val="accent6">
+                <a:lumMod val="75000"/>
+              </a:schemeClr>
+            </a:solidFill>
+          </a:ln>
+          <a:effectLst/>
+        </p:spPr>
+        <p:style>
+          <a:lnRef idx="1">
+            <a:schemeClr val="accent2"/>
+          </a:lnRef>
+          <a:fillRef idx="2">
+            <a:schemeClr val="accent2"/>
+          </a:fillRef>
+          <a:effectRef idx="1">
+            <a:schemeClr val="accent2"/>
+          </a:effectRef>
+          <a:fontRef idx="minor">
+            <a:schemeClr val="dk1"/>
+          </a:fontRef>
+        </p:style>
+        <p:txBody>
+          <a:bodyPr rtlCol="0" anchor="ctr"/>
+          <a:lstStyle/>
+          <a:p>
+            <a:pPr algn="ctr"/>
+            <a:r>
+              <a:rPr lang="en-US" sz="1050" dirty="0" err="1">
+                <a:solidFill>
+                  <a:schemeClr val="bg1"/>
+                </a:solidFill>
+              </a:rPr>
+              <a:t>JsonUserPrefs</a:t>
+            </a:r>
+            <a:r>
+              <a:rPr lang="en-US" sz="1050" dirty="0">
+                <a:solidFill>
+                  <a:schemeClr val="bg1"/>
+                </a:solidFill>
+              </a:rPr>
+              <a:t/>
+            </a:r>
+            <a:br>
+              <a:rPr lang="en-US" sz="1050" dirty="0">
+                <a:solidFill>
+                  <a:schemeClr val="bg1"/>
+                </a:solidFill>
+              </a:rPr>
+            </a:br>
+            <a:r>
+              <a:rPr lang="en-US" sz="1050" dirty="0">
+                <a:solidFill>
+                  <a:schemeClr val="bg1"/>
+                </a:solidFill>
+              </a:rPr>
+              <a:t>Storage</a:t>
+            </a:r>
+            <a:endParaRPr lang="en-SG" sz="1050" dirty="0">
+              <a:solidFill>
+                <a:schemeClr val="bg1"/>
+              </a:solidFill>
+            </a:endParaRPr>
+          </a:p>
+        </p:txBody>
+      </p:sp>
+      <p:sp>
+        <p:nvSpPr>
+          <p:cNvPr id="66" name="Rectangle 8"/>
+          <p:cNvSpPr/>
+          <p:nvPr/>
+        </p:nvSpPr>
+        <p:spPr>
+          <a:xfrm>
+            <a:off x="7782561" y="2183274"/>
+            <a:ext cx="1200707" cy="346760"/>
+          </a:xfrm>
+          <a:prstGeom prst="rect">
+            <a:avLst/>
+          </a:prstGeom>
+          <a:ln w="19050"/>
+          <a:effectLst/>
+        </p:spPr>
+        <p:style>
+          <a:lnRef idx="1">
+            <a:schemeClr val="accent6"/>
+          </a:lnRef>
+          <a:fillRef idx="2">
+            <a:schemeClr val="accent6"/>
+          </a:fillRef>
+          <a:effectRef idx="1">
+            <a:schemeClr val="accent6"/>
+          </a:effectRef>
+          <a:fontRef idx="minor">
+            <a:schemeClr val="dk1"/>
+          </a:fontRef>
+        </p:style>
+        <p:txBody>
+          <a:bodyPr rtlCol="0" anchor="ctr"/>
+          <a:lstStyle/>
+          <a:p>
+            <a:pPr algn="ctr"/>
+            <a:r>
+              <a:rPr lang="en-US" sz="1050" b="1" dirty="0" err="1" smtClean="0">
+                <a:solidFill>
+                  <a:schemeClr val="accent6">
+                    <a:lumMod val="75000"/>
+                  </a:schemeClr>
+                </a:solidFill>
+              </a:rPr>
+              <a:t>XmlSerializable</a:t>
+            </a:r>
+            <a:r>
+              <a:rPr lang="en-US" sz="1050" b="1" dirty="0">
+                <a:solidFill>
+                  <a:schemeClr val="accent6">
+                    <a:lumMod val="75000"/>
+                  </a:schemeClr>
+                </a:solidFill>
+              </a:rPr>
+              <a:t/>
+            </a:r>
+            <a:br>
+              <a:rPr lang="en-US" sz="1050" b="1" dirty="0">
+                <a:solidFill>
+                  <a:schemeClr val="accent6">
+                    <a:lumMod val="75000"/>
+                  </a:schemeClr>
+                </a:solidFill>
+              </a:rPr>
+            </a:br>
+            <a:r>
+              <a:rPr lang="en-US" sz="1050" b="1" dirty="0" err="1" smtClean="0">
+                <a:solidFill>
+                  <a:schemeClr val="accent6">
+                    <a:lumMod val="75000"/>
+                  </a:schemeClr>
+                </a:solidFill>
+              </a:rPr>
+              <a:t>TaskCollection</a:t>
+            </a:r>
+            <a:endParaRPr lang="en-SG" sz="1050" b="1" dirty="0">
+              <a:solidFill>
+                <a:schemeClr val="accent6">
+                  <a:lumMod val="75000"/>
+                </a:schemeClr>
+              </a:solidFill>
+            </a:endParaRPr>
+          </a:p>
+        </p:txBody>
+      </p:sp>
+      <p:sp>
+        <p:nvSpPr>
+          <p:cNvPr id="73" name="Rectangle 8"/>
+          <p:cNvSpPr/>
+          <p:nvPr/>
+        </p:nvSpPr>
+        <p:spPr>
+          <a:xfrm>
+            <a:off x="8427720" y="1371600"/>
+            <a:ext cx="1259718" cy="346760"/>
+          </a:xfrm>
+          <a:prstGeom prst="rect">
+            <a:avLst/>
+          </a:prstGeom>
+          <a:ln w="19050"/>
+          <a:effectLst/>
+        </p:spPr>
+        <p:style>
+          <a:lnRef idx="1">
+            <a:schemeClr val="accent6"/>
+          </a:lnRef>
+          <a:fillRef idx="2">
+            <a:schemeClr val="accent6"/>
+          </a:fillRef>
+          <a:effectRef idx="1">
+            <a:schemeClr val="accent6"/>
+          </a:effectRef>
+          <a:fontRef idx="minor">
+            <a:schemeClr val="dk1"/>
+          </a:fontRef>
+        </p:style>
+        <p:txBody>
+          <a:bodyPr rtlCol="0" anchor="ctr"/>
+          <a:lstStyle/>
+          <a:p>
+            <a:pPr algn="ctr"/>
+            <a:r>
+              <a:rPr lang="en-US" sz="1050" b="1" dirty="0" err="1">
+                <a:solidFill>
+                  <a:schemeClr val="accent6">
+                    <a:lumMod val="75000"/>
+                  </a:schemeClr>
+                </a:solidFill>
+              </a:rPr>
+              <a:t>XmlAdaptedTag</a:t>
+            </a:r>
+            <a:endParaRPr lang="en-SG" sz="1050" b="1" dirty="0">
+              <a:solidFill>
+                <a:schemeClr val="accent6">
+                  <a:lumMod val="75000"/>
+                </a:schemeClr>
+              </a:solidFill>
+            </a:endParaRPr>
+          </a:p>
+        </p:txBody>
+      </p:sp>
+      <p:sp>
+        <p:nvSpPr>
+          <p:cNvPr id="74" name="Rectangle 8"/>
+          <p:cNvSpPr/>
+          <p:nvPr/>
+        </p:nvSpPr>
+        <p:spPr>
+          <a:xfrm>
+            <a:off x="9252752" y="2185633"/>
+            <a:ext cx="1259718" cy="346760"/>
+          </a:xfrm>
+          <a:prstGeom prst="rect">
+            <a:avLst/>
+          </a:prstGeom>
+          <a:ln w="19050"/>
+          <a:effectLst/>
+        </p:spPr>
+        <p:style>
+          <a:lnRef idx="1">
+            <a:schemeClr val="accent6"/>
+          </a:lnRef>
+          <a:fillRef idx="2">
+            <a:schemeClr val="accent6"/>
+          </a:fillRef>
+          <a:effectRef idx="1">
+            <a:schemeClr val="accent6"/>
+          </a:effectRef>
+          <a:fontRef idx="minor">
+            <a:schemeClr val="dk1"/>
+          </a:fontRef>
+        </p:style>
+        <p:txBody>
+          <a:bodyPr rtlCol="0" anchor="ctr"/>
+          <a:lstStyle/>
+          <a:p>
+            <a:pPr algn="ctr"/>
+            <a:r>
+              <a:rPr lang="en-US" sz="1050" b="1" dirty="0" err="1" smtClean="0">
+                <a:solidFill>
+                  <a:schemeClr val="accent6">
+                    <a:lumMod val="75000"/>
+                  </a:schemeClr>
+                </a:solidFill>
+              </a:rPr>
+              <a:t>XmlAdaptedTask</a:t>
+            </a:r>
+            <a:endParaRPr lang="en-SG" sz="1050" b="1" dirty="0">
+              <a:solidFill>
+                <a:schemeClr val="accent6">
+                  <a:lumMod val="75000"/>
+                </a:schemeClr>
+              </a:solidFill>
+            </a:endParaRPr>
+          </a:p>
+        </p:txBody>
+      </p:sp>
       <p:cxnSp>
         <p:nvCxnSpPr>
-          <p:cNvPr id="124" name="Elbow Connector 122"/>
+          <p:cNvPr id="77" name="Elbow Connector 122"/>
           <p:cNvCxnSpPr>
-            <a:stCxn id="50" idx="3"/>
-            <a:endCxn id="66" idx="1"/>
+            <a:stCxn id="66" idx="3"/>
+            <a:endCxn id="74" idx="1"/>
           </p:cNvCxnSpPr>
           <p:nvPr/>
         </p:nvCxnSpPr>
         <p:spPr>
           <a:xfrm>
-            <a:off x="5791200" y="3331820"/>
-            <a:ext cx="228600" cy="1970"/>
+            <a:off x="8983268" y="2356654"/>
+            <a:ext cx="269484" cy="2359"/>
+          </a:xfrm>
+          <a:prstGeom prst="bentConnector3">
+            <a:avLst>
+              <a:gd name="adj1" fmla="val 50000"/>
+            </a:avLst>
+          </a:prstGeom>
+          <a:ln w="19050">
+            <a:prstDash val="sysDot"/>
+            <a:headEnd type="none" w="med" len="med"/>
+            <a:tailEnd type="arrow" w="med" len="med"/>
+          </a:ln>
+          <a:effectLst/>
+        </p:spPr>
+        <p:style>
+          <a:lnRef idx="1">
+            <a:schemeClr val="accent6"/>
+          </a:lnRef>
+          <a:fillRef idx="2">
+            <a:schemeClr val="accent6"/>
+          </a:fillRef>
+          <a:effectRef idx="1">
+            <a:schemeClr val="accent6"/>
+          </a:effectRef>
+          <a:fontRef idx="minor">
+            <a:schemeClr val="dk1"/>
+          </a:fontRef>
+        </p:style>
+      </p:cxnSp>
+      <p:cxnSp>
+        <p:nvCxnSpPr>
+          <p:cNvPr id="26" name="Straight Arrow Connector 25">
+            <a:extLst>
+              <a:ext uri="{FF2B5EF4-FFF2-40B4-BE49-F238E27FC236}">
+                <a16:creationId xmlns:a16="http://schemas.microsoft.com/office/drawing/2014/main" xmlns="" id="{A2AB4250-FF21-406B-98CC-8CD1CCEC2E0E}"/>
+              </a:ext>
+            </a:extLst>
+          </p:cNvPr>
+          <p:cNvCxnSpPr>
+            <a:stCxn id="27" idx="3"/>
+            <a:endCxn id="32" idx="1"/>
+          </p:cNvCxnSpPr>
+          <p:nvPr/>
+        </p:nvCxnSpPr>
+        <p:spPr>
+          <a:xfrm>
+            <a:off x="1726443" y="3865220"/>
+            <a:ext cx="273212" cy="0"/>
+          </a:xfrm>
+          <a:prstGeom prst="straightConnector1">
+            <a:avLst/>
+          </a:prstGeom>
+          <a:ln w="19050">
+            <a:solidFill>
+              <a:schemeClr val="accent6">
+                <a:lumMod val="75000"/>
+              </a:schemeClr>
+            </a:solidFill>
+            <a:headEnd type="none" w="med" len="med"/>
+            <a:tailEnd type="arrow" w="med" len="med"/>
+          </a:ln>
+          <a:effectLst/>
+        </p:spPr>
+        <p:style>
+          <a:lnRef idx="1">
+            <a:schemeClr val="accent2"/>
+          </a:lnRef>
+          <a:fillRef idx="2">
+            <a:schemeClr val="accent2"/>
+          </a:fillRef>
+          <a:effectRef idx="1">
+            <a:schemeClr val="accent2"/>
+          </a:effectRef>
+          <a:fontRef idx="minor">
+            <a:schemeClr val="dk1"/>
+          </a:fontRef>
+        </p:style>
+      </p:cxnSp>
+      <p:sp>
+        <p:nvSpPr>
+          <p:cNvPr id="27" name="Flowchart: Decision 96">
+            <a:extLst>
+              <a:ext uri="{FF2B5EF4-FFF2-40B4-BE49-F238E27FC236}">
+                <a16:creationId xmlns:a16="http://schemas.microsoft.com/office/drawing/2014/main" xmlns="" id="{1CB1A82D-B7B9-4751-B844-172526D6A2BB}"/>
+              </a:ext>
+            </a:extLst>
+          </p:cNvPr>
+          <p:cNvSpPr/>
+          <p:nvPr/>
+        </p:nvSpPr>
+        <p:spPr>
+          <a:xfrm>
+            <a:off x="1473403" y="3786745"/>
+            <a:ext cx="253040" cy="156950"/>
+          </a:xfrm>
+          <a:prstGeom prst="flowChartDecision">
+            <a:avLst/>
+          </a:prstGeom>
+          <a:noFill/>
+          <a:ln w="19050">
+            <a:solidFill>
+              <a:schemeClr val="accent6">
+                <a:lumMod val="75000"/>
+              </a:schemeClr>
+            </a:solidFill>
+          </a:ln>
+          <a:effectLst/>
+        </p:spPr>
+        <p:style>
+          <a:lnRef idx="1">
+            <a:schemeClr val="accent2"/>
+          </a:lnRef>
+          <a:fillRef idx="2">
+            <a:schemeClr val="accent2"/>
+          </a:fillRef>
+          <a:effectRef idx="1">
+            <a:schemeClr val="accent2"/>
+          </a:effectRef>
+          <a:fontRef idx="minor">
+            <a:schemeClr val="dk1"/>
+          </a:fontRef>
+        </p:style>
+        <p:txBody>
+          <a:bodyPr rtlCol="0" anchor="ctr"/>
+          <a:lstStyle/>
+          <a:p>
+            <a:pPr algn="ctr"/>
+            <a:endParaRPr lang="en-US" sz="1050">
+              <a:solidFill>
+                <a:schemeClr val="bg1"/>
+              </a:solidFill>
+            </a:endParaRPr>
+          </a:p>
+        </p:txBody>
+      </p:sp>
+      <p:sp>
+        <p:nvSpPr>
+          <p:cNvPr id="32" name="Rectangle 8">
+            <a:extLst>
+              <a:ext uri="{FF2B5EF4-FFF2-40B4-BE49-F238E27FC236}">
+                <a16:creationId xmlns:a16="http://schemas.microsoft.com/office/drawing/2014/main" xmlns="" id="{A2F02829-0356-4FB8-9CE0-B88093B4E8AF}"/>
+              </a:ext>
+            </a:extLst>
+          </p:cNvPr>
+          <p:cNvSpPr/>
+          <p:nvPr/>
+        </p:nvSpPr>
+        <p:spPr>
+          <a:xfrm>
+            <a:off x="1999655" y="3691840"/>
+            <a:ext cx="1433654" cy="346760"/>
+          </a:xfrm>
+          <a:prstGeom prst="rect">
+            <a:avLst/>
+          </a:prstGeom>
+          <a:solidFill>
+            <a:schemeClr val="accent6">
+              <a:lumMod val="75000"/>
+            </a:schemeClr>
+          </a:solidFill>
+          <a:ln w="19050">
+            <a:solidFill>
+              <a:schemeClr val="accent6">
+                <a:lumMod val="75000"/>
+              </a:schemeClr>
+            </a:solidFill>
+          </a:ln>
+          <a:effectLst/>
+        </p:spPr>
+        <p:style>
+          <a:lnRef idx="1">
+            <a:schemeClr val="accent2"/>
+          </a:lnRef>
+          <a:fillRef idx="2">
+            <a:schemeClr val="accent2"/>
+          </a:fillRef>
+          <a:effectRef idx="1">
+            <a:schemeClr val="accent2"/>
+          </a:effectRef>
+          <a:fontRef idx="minor">
+            <a:schemeClr val="dk1"/>
+          </a:fontRef>
+        </p:style>
+        <p:txBody>
+          <a:bodyPr rtlCol="0" anchor="ctr"/>
+          <a:lstStyle/>
+          <a:p>
+            <a:pPr algn="ctr"/>
+            <a:r>
+              <a:rPr lang="en-US" sz="1050" dirty="0">
+                <a:solidFill>
+                  <a:schemeClr val="bg1"/>
+                </a:solidFill>
+              </a:rPr>
+              <a:t>&lt;&lt;interface&gt;&gt;</a:t>
+            </a:r>
+            <a:br>
+              <a:rPr lang="en-US" sz="1050" dirty="0">
+                <a:solidFill>
+                  <a:schemeClr val="bg1"/>
+                </a:solidFill>
+              </a:rPr>
+            </a:br>
+            <a:r>
+              <a:rPr lang="en-US" sz="1050" dirty="0" err="1">
+                <a:solidFill>
+                  <a:schemeClr val="bg1"/>
+                </a:solidFill>
+              </a:rPr>
+              <a:t>ImportExportStorage</a:t>
+            </a:r>
+            <a:endParaRPr lang="en-SG" sz="1050" dirty="0">
+              <a:solidFill>
+                <a:schemeClr val="bg1"/>
+              </a:solidFill>
+            </a:endParaRPr>
+          </a:p>
+        </p:txBody>
+      </p:sp>
+      <p:cxnSp>
+        <p:nvCxnSpPr>
+          <p:cNvPr id="46" name="Elbow Connector 63"/>
+          <p:cNvCxnSpPr>
+            <a:stCxn id="47" idx="3"/>
+          </p:cNvCxnSpPr>
+          <p:nvPr/>
+        </p:nvCxnSpPr>
+        <p:spPr>
+          <a:xfrm rot="10800000">
+            <a:off x="3451405" y="2664815"/>
+            <a:ext cx="430386" cy="3860"/>
+          </a:xfrm>
+          <a:prstGeom prst="bentConnector3">
+            <a:avLst>
+              <a:gd name="adj1" fmla="val 50000"/>
+            </a:avLst>
+          </a:prstGeom>
+          <a:ln w="19050">
+            <a:solidFill>
+              <a:schemeClr val="accent6">
+                <a:lumMod val="75000"/>
+              </a:schemeClr>
+            </a:solidFill>
+            <a:prstDash val="sysDot"/>
+            <a:headEnd type="none" w="med" len="med"/>
+            <a:tailEnd type="none" w="med" len="med"/>
+          </a:ln>
+          <a:effectLst/>
+        </p:spPr>
+        <p:style>
+          <a:lnRef idx="1">
+            <a:schemeClr val="accent2"/>
+          </a:lnRef>
+          <a:fillRef idx="2">
+            <a:schemeClr val="accent2"/>
+          </a:fillRef>
+          <a:effectRef idx="1">
+            <a:schemeClr val="accent2"/>
+          </a:effectRef>
+          <a:fontRef idx="minor">
+            <a:schemeClr val="dk1"/>
+          </a:fontRef>
+        </p:style>
+      </p:cxnSp>
+      <p:sp>
+        <p:nvSpPr>
+          <p:cNvPr id="47" name="Isosceles Triangle 102"/>
+          <p:cNvSpPr/>
+          <p:nvPr/>
+        </p:nvSpPr>
+        <p:spPr>
+          <a:xfrm rot="16200000" flipV="1">
+            <a:off x="3834300" y="2580913"/>
+            <a:ext cx="270504" cy="175523"/>
+          </a:xfrm>
+          <a:prstGeom prst="triangle">
+            <a:avLst/>
+          </a:prstGeom>
+          <a:solidFill>
+            <a:schemeClr val="accent6">
+              <a:lumMod val="75000"/>
+            </a:schemeClr>
+          </a:solidFill>
+          <a:ln w="19050">
+            <a:solidFill>
+              <a:schemeClr val="accent6">
+                <a:lumMod val="75000"/>
+              </a:schemeClr>
+            </a:solidFill>
+          </a:ln>
+          <a:effectLst/>
+        </p:spPr>
+        <p:style>
+          <a:lnRef idx="1">
+            <a:schemeClr val="accent2"/>
+          </a:lnRef>
+          <a:fillRef idx="2">
+            <a:schemeClr val="accent2"/>
+          </a:fillRef>
+          <a:effectRef idx="1">
+            <a:schemeClr val="accent2"/>
+          </a:effectRef>
+          <a:fontRef idx="minor">
+            <a:schemeClr val="dk1"/>
+          </a:fontRef>
+        </p:style>
+        <p:txBody>
+          <a:bodyPr rtlCol="0" anchor="ctr"/>
+          <a:lstStyle/>
+          <a:p>
+            <a:pPr algn="ctr"/>
+            <a:endParaRPr lang="en-SG" sz="1050">
+              <a:solidFill>
+                <a:schemeClr val="bg1"/>
+              </a:solidFill>
+            </a:endParaRPr>
+          </a:p>
+        </p:txBody>
+      </p:sp>
+      <p:sp>
+        <p:nvSpPr>
+          <p:cNvPr id="48" name="Rectangle 8"/>
+          <p:cNvSpPr/>
+          <p:nvPr/>
+        </p:nvSpPr>
+        <p:spPr>
+          <a:xfrm>
+            <a:off x="4066193" y="2942864"/>
+            <a:ext cx="1713076" cy="634107"/>
+          </a:xfrm>
+          <a:prstGeom prst="rect">
+            <a:avLst/>
+          </a:prstGeom>
+          <a:solidFill>
+            <a:schemeClr val="accent6">
+              <a:lumMod val="75000"/>
+            </a:schemeClr>
+          </a:solidFill>
+          <a:ln w="19050">
+            <a:solidFill>
+              <a:schemeClr val="accent6">
+                <a:lumMod val="75000"/>
+              </a:schemeClr>
+            </a:solidFill>
+          </a:ln>
+          <a:effectLst/>
+        </p:spPr>
+        <p:style>
+          <a:lnRef idx="1">
+            <a:schemeClr val="accent2"/>
+          </a:lnRef>
+          <a:fillRef idx="2">
+            <a:schemeClr val="accent2"/>
+          </a:fillRef>
+          <a:effectRef idx="1">
+            <a:schemeClr val="accent2"/>
+          </a:effectRef>
+          <a:fontRef idx="minor">
+            <a:schemeClr val="dk1"/>
+          </a:fontRef>
+        </p:style>
+        <p:txBody>
+          <a:bodyPr rtlCol="0" anchor="ctr"/>
+          <a:lstStyle/>
+          <a:p>
+            <a:pPr algn="ctr"/>
+            <a:r>
+              <a:rPr lang="en-US" sz="1050" dirty="0">
+                <a:solidFill>
+                  <a:schemeClr val="bg1"/>
+                </a:solidFill>
+              </a:rPr>
+              <a:t>&lt;&lt;interface&gt;&gt;</a:t>
+            </a:r>
+            <a:br>
+              <a:rPr lang="en-US" sz="1050" dirty="0">
+                <a:solidFill>
+                  <a:schemeClr val="bg1"/>
+                </a:solidFill>
+              </a:rPr>
+            </a:br>
+            <a:r>
+              <a:rPr lang="en-US" sz="1050" dirty="0" err="1" smtClean="0">
+                <a:solidFill>
+                  <a:schemeClr val="bg1"/>
+                </a:solidFill>
+              </a:rPr>
+              <a:t>TaskCollectionWriteStorage</a:t>
+            </a:r>
+            <a:endParaRPr lang="en-SG" sz="1050" dirty="0">
+              <a:solidFill>
+                <a:schemeClr val="bg1"/>
+              </a:solidFill>
+            </a:endParaRPr>
+          </a:p>
+        </p:txBody>
+      </p:sp>
+      <p:sp>
+        <p:nvSpPr>
+          <p:cNvPr id="59" name="Rectangle 8"/>
+          <p:cNvSpPr/>
+          <p:nvPr/>
+        </p:nvSpPr>
+        <p:spPr>
+          <a:xfrm>
+            <a:off x="4069577" y="2499127"/>
+            <a:ext cx="1713077" cy="346760"/>
+          </a:xfrm>
+          <a:prstGeom prst="rect">
+            <a:avLst/>
+          </a:prstGeom>
+          <a:solidFill>
+            <a:schemeClr val="accent6">
+              <a:lumMod val="75000"/>
+            </a:schemeClr>
+          </a:solidFill>
+          <a:ln w="19050">
+            <a:solidFill>
+              <a:schemeClr val="accent6">
+                <a:lumMod val="75000"/>
+              </a:schemeClr>
+            </a:solidFill>
+          </a:ln>
+          <a:effectLst/>
+        </p:spPr>
+        <p:style>
+          <a:lnRef idx="1">
+            <a:schemeClr val="accent2"/>
+          </a:lnRef>
+          <a:fillRef idx="2">
+            <a:schemeClr val="accent2"/>
+          </a:fillRef>
+          <a:effectRef idx="1">
+            <a:schemeClr val="accent2"/>
+          </a:effectRef>
+          <a:fontRef idx="minor">
+            <a:schemeClr val="dk1"/>
+          </a:fontRef>
+        </p:style>
+        <p:txBody>
+          <a:bodyPr rtlCol="0" anchor="ctr"/>
+          <a:lstStyle/>
+          <a:p>
+            <a:pPr algn="ctr"/>
+            <a:r>
+              <a:rPr lang="en-US" sz="1050" dirty="0">
+                <a:solidFill>
+                  <a:schemeClr val="bg1"/>
+                </a:solidFill>
+              </a:rPr>
+              <a:t>&lt;&lt;interface&gt;&gt;</a:t>
+            </a:r>
+            <a:br>
+              <a:rPr lang="en-US" sz="1050" dirty="0">
+                <a:solidFill>
+                  <a:schemeClr val="bg1"/>
+                </a:solidFill>
+              </a:rPr>
+            </a:br>
+            <a:r>
+              <a:rPr lang="en-US" sz="1050" dirty="0" err="1" smtClean="0">
+                <a:solidFill>
+                  <a:schemeClr val="bg1"/>
+                </a:solidFill>
+              </a:rPr>
+              <a:t>TaskCollectionReadStorage</a:t>
+            </a:r>
+            <a:endParaRPr lang="en-SG" sz="1050" dirty="0">
+              <a:solidFill>
+                <a:schemeClr val="bg1"/>
+              </a:solidFill>
+            </a:endParaRPr>
+          </a:p>
+        </p:txBody>
+      </p:sp>
+      <p:cxnSp>
+        <p:nvCxnSpPr>
+          <p:cNvPr id="62" name="Elbow Connector 63"/>
+          <p:cNvCxnSpPr>
+            <a:stCxn id="67" idx="3"/>
+            <a:endCxn id="175" idx="1"/>
+          </p:cNvCxnSpPr>
+          <p:nvPr/>
+        </p:nvCxnSpPr>
+        <p:spPr>
+          <a:xfrm>
+            <a:off x="5976137" y="3424477"/>
+            <a:ext cx="1309031" cy="2643"/>
+          </a:xfrm>
+          <a:prstGeom prst="bentConnector3">
+            <a:avLst>
+              <a:gd name="adj1" fmla="val 50000"/>
+            </a:avLst>
+          </a:prstGeom>
+          <a:ln w="19050">
+            <a:solidFill>
+              <a:schemeClr val="accent6">
+                <a:lumMod val="75000"/>
+              </a:schemeClr>
+            </a:solidFill>
+            <a:prstDash val="sysDot"/>
+            <a:headEnd type="none" w="med" len="med"/>
+            <a:tailEnd type="none" w="med" len="med"/>
+          </a:ln>
+          <a:effectLst/>
+        </p:spPr>
+        <p:style>
+          <a:lnRef idx="1">
+            <a:schemeClr val="accent2"/>
+          </a:lnRef>
+          <a:fillRef idx="2">
+            <a:schemeClr val="accent2"/>
+          </a:fillRef>
+          <a:effectRef idx="1">
+            <a:schemeClr val="accent2"/>
+          </a:effectRef>
+          <a:fontRef idx="minor">
+            <a:schemeClr val="dk1"/>
+          </a:fontRef>
+        </p:style>
+      </p:cxnSp>
+      <p:sp>
+        <p:nvSpPr>
+          <p:cNvPr id="67" name="Isosceles Triangle 102"/>
+          <p:cNvSpPr/>
+          <p:nvPr/>
+        </p:nvSpPr>
+        <p:spPr>
+          <a:xfrm rot="5400000" flipV="1">
+            <a:off x="5753123" y="3336715"/>
+            <a:ext cx="270504" cy="175523"/>
+          </a:xfrm>
+          <a:prstGeom prst="triangle">
+            <a:avLst/>
+          </a:prstGeom>
+          <a:solidFill>
+            <a:schemeClr val="accent6">
+              <a:lumMod val="75000"/>
+            </a:schemeClr>
+          </a:solidFill>
+          <a:ln w="19050">
+            <a:solidFill>
+              <a:schemeClr val="accent6">
+                <a:lumMod val="75000"/>
+              </a:schemeClr>
+            </a:solidFill>
+          </a:ln>
+          <a:effectLst/>
+        </p:spPr>
+        <p:style>
+          <a:lnRef idx="1">
+            <a:schemeClr val="accent2"/>
+          </a:lnRef>
+          <a:fillRef idx="2">
+            <a:schemeClr val="accent2"/>
+          </a:fillRef>
+          <a:effectRef idx="1">
+            <a:schemeClr val="accent2"/>
+          </a:effectRef>
+          <a:fontRef idx="minor">
+            <a:schemeClr val="dk1"/>
+          </a:fontRef>
+        </p:style>
+        <p:txBody>
+          <a:bodyPr rtlCol="0" anchor="ctr"/>
+          <a:lstStyle/>
+          <a:p>
+            <a:pPr algn="ctr"/>
+            <a:endParaRPr lang="en-SG" sz="1050">
+              <a:solidFill>
+                <a:schemeClr val="bg1"/>
+              </a:solidFill>
+            </a:endParaRPr>
+          </a:p>
+        </p:txBody>
+      </p:sp>
+      <p:cxnSp>
+        <p:nvCxnSpPr>
+          <p:cNvPr id="122" name="Elbow Connector 63"/>
+          <p:cNvCxnSpPr>
+            <a:stCxn id="123" idx="3"/>
+            <a:endCxn id="50" idx="2"/>
+          </p:cNvCxnSpPr>
+          <p:nvPr/>
+        </p:nvCxnSpPr>
+        <p:spPr>
+          <a:xfrm flipV="1">
+            <a:off x="5965238" y="2532187"/>
+            <a:ext cx="832598" cy="136488"/>
+          </a:xfrm>
+          <a:prstGeom prst="bentConnector2">
+            <a:avLst/>
+          </a:prstGeom>
+          <a:ln w="19050">
+            <a:solidFill>
+              <a:schemeClr val="accent6">
+                <a:lumMod val="75000"/>
+              </a:schemeClr>
+            </a:solidFill>
+            <a:prstDash val="sysDot"/>
+            <a:headEnd type="none" w="med" len="med"/>
+            <a:tailEnd type="none" w="med" len="med"/>
+          </a:ln>
+          <a:effectLst/>
+        </p:spPr>
+        <p:style>
+          <a:lnRef idx="1">
+            <a:schemeClr val="accent2"/>
+          </a:lnRef>
+          <a:fillRef idx="2">
+            <a:schemeClr val="accent2"/>
+          </a:fillRef>
+          <a:effectRef idx="1">
+            <a:schemeClr val="accent2"/>
+          </a:effectRef>
+          <a:fontRef idx="minor">
+            <a:schemeClr val="dk1"/>
+          </a:fontRef>
+        </p:style>
+      </p:cxnSp>
+      <p:sp>
+        <p:nvSpPr>
+          <p:cNvPr id="123" name="Isosceles Triangle 102"/>
+          <p:cNvSpPr/>
+          <p:nvPr/>
+        </p:nvSpPr>
+        <p:spPr>
+          <a:xfrm rot="5400000" flipV="1">
+            <a:off x="5742224" y="2580913"/>
+            <a:ext cx="270504" cy="175523"/>
+          </a:xfrm>
+          <a:prstGeom prst="triangle">
+            <a:avLst/>
+          </a:prstGeom>
+          <a:solidFill>
+            <a:schemeClr val="accent6">
+              <a:lumMod val="75000"/>
+            </a:schemeClr>
+          </a:solidFill>
+          <a:ln w="19050">
+            <a:solidFill>
+              <a:schemeClr val="accent6">
+                <a:lumMod val="75000"/>
+              </a:schemeClr>
+            </a:solidFill>
+          </a:ln>
+          <a:effectLst/>
+        </p:spPr>
+        <p:style>
+          <a:lnRef idx="1">
+            <a:schemeClr val="accent2"/>
+          </a:lnRef>
+          <a:fillRef idx="2">
+            <a:schemeClr val="accent2"/>
+          </a:fillRef>
+          <a:effectRef idx="1">
+            <a:schemeClr val="accent2"/>
+          </a:effectRef>
+          <a:fontRef idx="minor">
+            <a:schemeClr val="dk1"/>
+          </a:fontRef>
+        </p:style>
+        <p:txBody>
+          <a:bodyPr rtlCol="0" anchor="ctr"/>
+          <a:lstStyle/>
+          <a:p>
+            <a:pPr algn="ctr"/>
+            <a:endParaRPr lang="en-SG" sz="1050">
+              <a:solidFill>
+                <a:schemeClr val="bg1"/>
+              </a:solidFill>
+            </a:endParaRPr>
+          </a:p>
+        </p:txBody>
+      </p:sp>
+      <p:cxnSp>
+        <p:nvCxnSpPr>
+          <p:cNvPr id="125" name="Elbow Connector 63"/>
+          <p:cNvCxnSpPr>
+            <a:stCxn id="126" idx="3"/>
+            <a:endCxn id="50" idx="2"/>
+          </p:cNvCxnSpPr>
+          <p:nvPr/>
+        </p:nvCxnSpPr>
+        <p:spPr>
+          <a:xfrm flipV="1">
+            <a:off x="5962640" y="2532187"/>
+            <a:ext cx="835196" cy="575937"/>
+          </a:xfrm>
+          <a:prstGeom prst="bentConnector2">
+            <a:avLst/>
+          </a:prstGeom>
+          <a:ln w="19050">
+            <a:solidFill>
+              <a:schemeClr val="accent6">
+                <a:lumMod val="75000"/>
+              </a:schemeClr>
+            </a:solidFill>
+            <a:prstDash val="sysDot"/>
+            <a:headEnd type="none" w="med" len="med"/>
+            <a:tailEnd type="none" w="med" len="med"/>
+          </a:ln>
+          <a:effectLst/>
+        </p:spPr>
+        <p:style>
+          <a:lnRef idx="1">
+            <a:schemeClr val="accent2"/>
+          </a:lnRef>
+          <a:fillRef idx="2">
+            <a:schemeClr val="accent2"/>
+          </a:fillRef>
+          <a:effectRef idx="1">
+            <a:schemeClr val="accent2"/>
+          </a:effectRef>
+          <a:fontRef idx="minor">
+            <a:schemeClr val="dk1"/>
+          </a:fontRef>
+        </p:style>
+      </p:cxnSp>
+      <p:sp>
+        <p:nvSpPr>
+          <p:cNvPr id="126" name="Isosceles Triangle 102"/>
+          <p:cNvSpPr/>
+          <p:nvPr/>
+        </p:nvSpPr>
+        <p:spPr>
+          <a:xfrm rot="5400000" flipV="1">
+            <a:off x="5739626" y="3020362"/>
+            <a:ext cx="270504" cy="175523"/>
+          </a:xfrm>
+          <a:prstGeom prst="triangle">
+            <a:avLst/>
+          </a:prstGeom>
+          <a:solidFill>
+            <a:schemeClr val="accent6">
+              <a:lumMod val="75000"/>
+            </a:schemeClr>
+          </a:solidFill>
+          <a:ln w="19050">
+            <a:solidFill>
+              <a:schemeClr val="accent6">
+                <a:lumMod val="75000"/>
+              </a:schemeClr>
+            </a:solidFill>
+          </a:ln>
+          <a:effectLst/>
+        </p:spPr>
+        <p:style>
+          <a:lnRef idx="1">
+            <a:schemeClr val="accent2"/>
+          </a:lnRef>
+          <a:fillRef idx="2">
+            <a:schemeClr val="accent2"/>
+          </a:fillRef>
+          <a:effectRef idx="1">
+            <a:schemeClr val="accent2"/>
+          </a:effectRef>
+          <a:fontRef idx="minor">
+            <a:schemeClr val="dk1"/>
+          </a:fontRef>
+        </p:style>
+        <p:txBody>
+          <a:bodyPr rtlCol="0" anchor="ctr"/>
+          <a:lstStyle/>
+          <a:p>
+            <a:pPr algn="ctr"/>
+            <a:endParaRPr lang="en-SG" sz="1050">
+              <a:solidFill>
+                <a:schemeClr val="bg1"/>
+              </a:solidFill>
+            </a:endParaRPr>
+          </a:p>
+        </p:txBody>
+      </p:sp>
+      <p:cxnSp>
+        <p:nvCxnSpPr>
+          <p:cNvPr id="164" name="Elbow Connector 63"/>
+          <p:cNvCxnSpPr>
+            <a:stCxn id="165" idx="3"/>
+          </p:cNvCxnSpPr>
+          <p:nvPr/>
+        </p:nvCxnSpPr>
+        <p:spPr>
+          <a:xfrm rot="10800000">
+            <a:off x="3430210" y="3044060"/>
+            <a:ext cx="460460" cy="289992"/>
+          </a:xfrm>
+          <a:prstGeom prst="bentConnector3">
+            <a:avLst>
+              <a:gd name="adj1" fmla="val 50000"/>
+            </a:avLst>
+          </a:prstGeom>
+          <a:ln w="19050">
+            <a:solidFill>
+              <a:schemeClr val="accent6">
+                <a:lumMod val="75000"/>
+              </a:schemeClr>
+            </a:solidFill>
+            <a:prstDash val="sysDot"/>
+            <a:headEnd type="none" w="med" len="med"/>
+            <a:tailEnd type="none" w="med" len="med"/>
+          </a:ln>
+          <a:effectLst/>
+        </p:spPr>
+        <p:style>
+          <a:lnRef idx="1">
+            <a:schemeClr val="accent2"/>
+          </a:lnRef>
+          <a:fillRef idx="2">
+            <a:schemeClr val="accent2"/>
+          </a:fillRef>
+          <a:effectRef idx="1">
+            <a:schemeClr val="accent2"/>
+          </a:effectRef>
+          <a:fontRef idx="minor">
+            <a:schemeClr val="dk1"/>
+          </a:fontRef>
+        </p:style>
+      </p:cxnSp>
+      <p:sp>
+        <p:nvSpPr>
+          <p:cNvPr id="165" name="Isosceles Triangle 102"/>
+          <p:cNvSpPr/>
+          <p:nvPr/>
+        </p:nvSpPr>
+        <p:spPr>
+          <a:xfrm rot="16200000" flipV="1">
+            <a:off x="3843179" y="3246290"/>
+            <a:ext cx="270504" cy="175523"/>
+          </a:xfrm>
+          <a:prstGeom prst="triangle">
+            <a:avLst/>
+          </a:prstGeom>
+          <a:solidFill>
+            <a:schemeClr val="accent6">
+              <a:lumMod val="75000"/>
+            </a:schemeClr>
+          </a:solidFill>
+          <a:ln w="19050">
+            <a:solidFill>
+              <a:schemeClr val="accent6">
+                <a:lumMod val="75000"/>
+              </a:schemeClr>
+            </a:solidFill>
+          </a:ln>
+          <a:effectLst/>
+        </p:spPr>
+        <p:style>
+          <a:lnRef idx="1">
+            <a:schemeClr val="accent2"/>
+          </a:lnRef>
+          <a:fillRef idx="2">
+            <a:schemeClr val="accent2"/>
+          </a:fillRef>
+          <a:effectRef idx="1">
+            <a:schemeClr val="accent2"/>
+          </a:effectRef>
+          <a:fontRef idx="minor">
+            <a:schemeClr val="dk1"/>
+          </a:fontRef>
+        </p:style>
+        <p:txBody>
+          <a:bodyPr rtlCol="0" anchor="ctr"/>
+          <a:lstStyle/>
+          <a:p>
+            <a:pPr algn="ctr"/>
+            <a:endParaRPr lang="en-SG" sz="1050">
+              <a:solidFill>
+                <a:schemeClr val="bg1"/>
+              </a:solidFill>
+            </a:endParaRPr>
+          </a:p>
+        </p:txBody>
+      </p:sp>
+      <p:sp>
+        <p:nvSpPr>
+          <p:cNvPr id="175" name="Rectangle 8"/>
+          <p:cNvSpPr/>
+          <p:nvPr/>
+        </p:nvSpPr>
+        <p:spPr>
+          <a:xfrm>
+            <a:off x="7285168" y="3253740"/>
+            <a:ext cx="1305268" cy="346760"/>
+          </a:xfrm>
+          <a:prstGeom prst="rect">
+            <a:avLst/>
+          </a:prstGeom>
+          <a:ln w="19050"/>
+          <a:effectLst/>
+        </p:spPr>
+        <p:style>
+          <a:lnRef idx="1">
+            <a:schemeClr val="accent6"/>
+          </a:lnRef>
+          <a:fillRef idx="2">
+            <a:schemeClr val="accent6"/>
+          </a:fillRef>
+          <a:effectRef idx="1">
+            <a:schemeClr val="accent6"/>
+          </a:effectRef>
+          <a:fontRef idx="minor">
+            <a:schemeClr val="dk1"/>
+          </a:fontRef>
+        </p:style>
+        <p:txBody>
+          <a:bodyPr rtlCol="0" anchor="ctr"/>
+          <a:lstStyle/>
+          <a:p>
+            <a:pPr algn="ctr"/>
+            <a:r>
+              <a:rPr lang="en-US" sz="1050" b="1" dirty="0" err="1" smtClean="0">
+                <a:solidFill>
+                  <a:schemeClr val="accent6">
+                    <a:lumMod val="75000"/>
+                  </a:schemeClr>
+                </a:solidFill>
+              </a:rPr>
+              <a:t>CsvTaskCollection</a:t>
+            </a:r>
+            <a:endParaRPr lang="en-US" sz="1050" b="1" dirty="0" smtClean="0">
+              <a:solidFill>
+                <a:schemeClr val="accent6">
+                  <a:lumMod val="75000"/>
+                </a:schemeClr>
+              </a:solidFill>
+            </a:endParaRPr>
+          </a:p>
+          <a:p>
+            <a:pPr algn="ctr"/>
+            <a:r>
+              <a:rPr lang="en-US" sz="1050" b="1" dirty="0" err="1" smtClean="0">
+                <a:solidFill>
+                  <a:schemeClr val="accent6">
+                    <a:lumMod val="75000"/>
+                  </a:schemeClr>
+                </a:solidFill>
+              </a:rPr>
+              <a:t>WriteStorage</a:t>
+            </a:r>
+            <a:endParaRPr lang="en-SG" sz="1050" b="1" dirty="0">
+              <a:solidFill>
+                <a:schemeClr val="accent6">
+                  <a:lumMod val="75000"/>
+                </a:schemeClr>
+              </a:solidFill>
+            </a:endParaRPr>
+          </a:p>
+        </p:txBody>
+      </p:sp>
+      <p:sp>
+        <p:nvSpPr>
+          <p:cNvPr id="176" name="Rectangle 8"/>
+          <p:cNvSpPr/>
+          <p:nvPr/>
+        </p:nvSpPr>
+        <p:spPr>
+          <a:xfrm>
+            <a:off x="8831203" y="3254226"/>
+            <a:ext cx="1200707" cy="346760"/>
+          </a:xfrm>
+          <a:prstGeom prst="rect">
+            <a:avLst/>
+          </a:prstGeom>
+          <a:ln w="19050"/>
+          <a:effectLst/>
+        </p:spPr>
+        <p:style>
+          <a:lnRef idx="1">
+            <a:schemeClr val="accent6"/>
+          </a:lnRef>
+          <a:fillRef idx="2">
+            <a:schemeClr val="accent6"/>
+          </a:fillRef>
+          <a:effectRef idx="1">
+            <a:schemeClr val="accent6"/>
+          </a:effectRef>
+          <a:fontRef idx="minor">
+            <a:schemeClr val="dk1"/>
+          </a:fontRef>
+        </p:style>
+        <p:txBody>
+          <a:bodyPr rtlCol="0" anchor="ctr"/>
+          <a:lstStyle/>
+          <a:p>
+            <a:pPr algn="ctr"/>
+            <a:r>
+              <a:rPr lang="en-US" sz="1050" b="1" dirty="0" err="1" smtClean="0">
+                <a:solidFill>
+                  <a:schemeClr val="accent6">
+                    <a:lumMod val="75000"/>
+                  </a:schemeClr>
+                </a:solidFill>
+              </a:rPr>
+              <a:t>CsvSerializable</a:t>
+            </a:r>
+            <a:r>
+              <a:rPr lang="en-US" sz="1050" b="1" dirty="0" smtClean="0">
+                <a:solidFill>
+                  <a:schemeClr val="accent6">
+                    <a:lumMod val="75000"/>
+                  </a:schemeClr>
+                </a:solidFill>
+              </a:rPr>
+              <a:t/>
+            </a:r>
+            <a:br>
+              <a:rPr lang="en-US" sz="1050" b="1" dirty="0" smtClean="0">
+                <a:solidFill>
+                  <a:schemeClr val="accent6">
+                    <a:lumMod val="75000"/>
+                  </a:schemeClr>
+                </a:solidFill>
+              </a:rPr>
+            </a:br>
+            <a:r>
+              <a:rPr lang="en-US" sz="1050" b="1" dirty="0" err="1" smtClean="0">
+                <a:solidFill>
+                  <a:schemeClr val="accent6">
+                    <a:lumMod val="75000"/>
+                  </a:schemeClr>
+                </a:solidFill>
+              </a:rPr>
+              <a:t>TaskCollection</a:t>
+            </a:r>
+            <a:endParaRPr lang="en-SG" sz="1050" b="1" dirty="0">
+              <a:solidFill>
+                <a:schemeClr val="accent6">
+                  <a:lumMod val="75000"/>
+                </a:schemeClr>
+              </a:solidFill>
+            </a:endParaRPr>
+          </a:p>
+        </p:txBody>
+      </p:sp>
+      <p:sp>
+        <p:nvSpPr>
+          <p:cNvPr id="180" name="Rectangle 8"/>
+          <p:cNvSpPr/>
+          <p:nvPr/>
+        </p:nvSpPr>
+        <p:spPr>
+          <a:xfrm>
+            <a:off x="9982200" y="1358022"/>
+            <a:ext cx="1558836" cy="381436"/>
+          </a:xfrm>
+          <a:prstGeom prst="rect">
+            <a:avLst/>
+          </a:prstGeom>
+          <a:ln w="19050"/>
+          <a:effectLst/>
+        </p:spPr>
+        <p:style>
+          <a:lnRef idx="1">
+            <a:schemeClr val="accent6"/>
+          </a:lnRef>
+          <a:fillRef idx="2">
+            <a:schemeClr val="accent6"/>
+          </a:fillRef>
+          <a:effectRef idx="1">
+            <a:schemeClr val="accent6"/>
+          </a:effectRef>
+          <a:fontRef idx="minor">
+            <a:schemeClr val="dk1"/>
+          </a:fontRef>
+        </p:style>
+        <p:txBody>
+          <a:bodyPr rtlCol="0" anchor="ctr"/>
+          <a:lstStyle/>
+          <a:p>
+            <a:pPr algn="ctr"/>
+            <a:r>
+              <a:rPr lang="en-US" sz="1050" b="1" dirty="0" err="1" smtClean="0">
+                <a:solidFill>
+                  <a:schemeClr val="accent6">
+                    <a:lumMod val="75000"/>
+                  </a:schemeClr>
+                </a:solidFill>
+              </a:rPr>
+              <a:t>XmlAdaptedAttachment</a:t>
+            </a:r>
+            <a:endParaRPr lang="en-SG" sz="1050" b="1" dirty="0">
+              <a:solidFill>
+                <a:schemeClr val="accent6">
+                  <a:lumMod val="75000"/>
+                </a:schemeClr>
+              </a:solidFill>
+            </a:endParaRPr>
+          </a:p>
+        </p:txBody>
+      </p:sp>
+      <p:sp>
+        <p:nvSpPr>
+          <p:cNvPr id="198" name="Rectangle 8"/>
+          <p:cNvSpPr/>
+          <p:nvPr/>
+        </p:nvSpPr>
+        <p:spPr>
+          <a:xfrm>
+            <a:off x="10310117" y="3257197"/>
+            <a:ext cx="1259718" cy="346760"/>
+          </a:xfrm>
+          <a:prstGeom prst="rect">
+            <a:avLst/>
+          </a:prstGeom>
+          <a:ln w="19050"/>
+          <a:effectLst/>
+        </p:spPr>
+        <p:style>
+          <a:lnRef idx="1">
+            <a:schemeClr val="accent6"/>
+          </a:lnRef>
+          <a:fillRef idx="2">
+            <a:schemeClr val="accent6"/>
+          </a:fillRef>
+          <a:effectRef idx="1">
+            <a:schemeClr val="accent6"/>
+          </a:effectRef>
+          <a:fontRef idx="minor">
+            <a:schemeClr val="dk1"/>
+          </a:fontRef>
+        </p:style>
+        <p:txBody>
+          <a:bodyPr rtlCol="0" anchor="ctr"/>
+          <a:lstStyle/>
+          <a:p>
+            <a:pPr algn="ctr"/>
+            <a:r>
+              <a:rPr lang="en-US" sz="1050" b="1" dirty="0" err="1" smtClean="0">
+                <a:solidFill>
+                  <a:schemeClr val="accent6">
+                    <a:lumMod val="75000"/>
+                  </a:schemeClr>
+                </a:solidFill>
+              </a:rPr>
+              <a:t>CsvAdaptedTask</a:t>
+            </a:r>
+            <a:endParaRPr lang="en-SG" sz="1050" b="1" dirty="0">
+              <a:solidFill>
+                <a:schemeClr val="accent6">
+                  <a:lumMod val="75000"/>
+                </a:schemeClr>
+              </a:solidFill>
+            </a:endParaRPr>
+          </a:p>
+        </p:txBody>
+      </p:sp>
+      <p:cxnSp>
+        <p:nvCxnSpPr>
+          <p:cNvPr id="199" name="Elbow Connector 122"/>
+          <p:cNvCxnSpPr>
+            <a:stCxn id="175" idx="3"/>
+            <a:endCxn id="176" idx="1"/>
+          </p:cNvCxnSpPr>
+          <p:nvPr/>
+        </p:nvCxnSpPr>
+        <p:spPr>
+          <a:xfrm>
+            <a:off x="8590436" y="3427120"/>
+            <a:ext cx="240767" cy="486"/>
           </a:xfrm>
           <a:prstGeom prst="bentConnector3">
             <a:avLst>
@@ -4267,93 +5992,196 @@
           </a:fontRef>
         </p:style>
       </p:cxnSp>
-      <p:sp>
-        <p:nvSpPr>
-          <p:cNvPr id="50" name="Rectangle 8"/>
-          <p:cNvSpPr/>
+      <p:cxnSp>
+        <p:nvCxnSpPr>
+          <p:cNvPr id="202" name="Elbow Connector 122"/>
+          <p:cNvCxnSpPr>
+            <a:stCxn id="176" idx="3"/>
+            <a:endCxn id="198" idx="1"/>
+          </p:cNvCxnSpPr>
           <p:nvPr/>
-        </p:nvSpPr>
+        </p:nvCxnSpPr>
         <p:spPr>
           <a:xfrm>
-            <a:off x="4621365" y="3158440"/>
-            <a:ext cx="1169835" cy="346760"/>
-          </a:xfrm>
-          <a:prstGeom prst="rect">
-            <a:avLst/>
+            <a:off x="10031910" y="3427606"/>
+            <a:ext cx="278207" cy="2971"/>
+          </a:xfrm>
+          <a:prstGeom prst="bentConnector3">
+            <a:avLst>
+              <a:gd name="adj1" fmla="val 50000"/>
+            </a:avLst>
           </a:prstGeom>
-          <a:ln w="19050"/>
+          <a:ln w="19050">
+            <a:solidFill>
+              <a:schemeClr val="accent6">
+                <a:lumMod val="75000"/>
+              </a:schemeClr>
+            </a:solidFill>
+            <a:prstDash val="sysDot"/>
+            <a:headEnd type="none" w="med" len="med"/>
+            <a:tailEnd type="arrow" w="med" len="med"/>
+          </a:ln>
           <a:effectLst/>
         </p:spPr>
         <p:style>
           <a:lnRef idx="1">
-            <a:schemeClr val="accent6"/>
+            <a:schemeClr val="accent2"/>
           </a:lnRef>
           <a:fillRef idx="2">
-            <a:schemeClr val="accent6"/>
+            <a:schemeClr val="accent2"/>
           </a:fillRef>
           <a:effectRef idx="1">
-            <a:schemeClr val="accent6"/>
+            <a:schemeClr val="accent2"/>
           </a:effectRef>
           <a:fontRef idx="minor">
             <a:schemeClr val="dk1"/>
           </a:fontRef>
         </p:style>
-        <p:txBody>
-          <a:bodyPr rtlCol="0" anchor="ctr"/>
-          <a:lstStyle/>
-          <a:p>
-            <a:pPr algn="ctr"/>
-            <a:r>
-              <a:rPr lang="en-US" sz="1050" b="1" dirty="0" err="1">
-                <a:solidFill>
-                  <a:schemeClr val="accent6">
-                    <a:lumMod val="75000"/>
-                  </a:schemeClr>
-                </a:solidFill>
-              </a:rPr>
-              <a:t>XmlAddressBook</a:t>
-            </a:r>
-            <a:br>
-              <a:rPr lang="en-US" sz="1050" b="1" dirty="0">
-                <a:solidFill>
-                  <a:schemeClr val="accent6">
-                    <a:lumMod val="75000"/>
-                  </a:schemeClr>
-                </a:solidFill>
-              </a:rPr>
-            </a:br>
-            <a:r>
-              <a:rPr lang="en-US" sz="1050" b="1" dirty="0">
-                <a:solidFill>
-                  <a:schemeClr val="accent6">
-                    <a:lumMod val="75000"/>
-                  </a:schemeClr>
-                </a:solidFill>
-              </a:rPr>
-              <a:t>Storage</a:t>
-            </a:r>
-            <a:endParaRPr lang="en-SG" sz="1050" b="1" dirty="0">
-              <a:solidFill>
-                <a:schemeClr val="accent6">
-                  <a:lumMod val="75000"/>
-                </a:schemeClr>
-              </a:solidFill>
-            </a:endParaRPr>
-          </a:p>
-        </p:txBody>
-      </p:sp>
-      <p:sp>
-        <p:nvSpPr>
-          <p:cNvPr id="52" name="Rectangle 8"/>
+      </p:cxnSp>
+      <p:cxnSp>
+        <p:nvCxnSpPr>
+          <p:cNvPr id="258" name="Elbow Connector 122"/>
+          <p:cNvCxnSpPr>
+            <a:stCxn id="32" idx="3"/>
+            <a:endCxn id="175" idx="2"/>
+          </p:cNvCxnSpPr>
+          <p:nvPr/>
+        </p:nvCxnSpPr>
+        <p:spPr>
+          <a:xfrm flipV="1">
+            <a:off x="3433309" y="3600500"/>
+            <a:ext cx="4504493" cy="264720"/>
+          </a:xfrm>
+          <a:prstGeom prst="bentConnector2">
+            <a:avLst/>
+          </a:prstGeom>
+          <a:ln w="19050">
+            <a:solidFill>
+              <a:schemeClr val="accent6">
+                <a:lumMod val="75000"/>
+              </a:schemeClr>
+            </a:solidFill>
+            <a:prstDash val="sysDot"/>
+            <a:headEnd type="none" w="med" len="med"/>
+            <a:tailEnd type="arrow" w="med" len="med"/>
+          </a:ln>
+          <a:effectLst/>
+        </p:spPr>
+        <p:style>
+          <a:lnRef idx="1">
+            <a:schemeClr val="accent2"/>
+          </a:lnRef>
+          <a:fillRef idx="2">
+            <a:schemeClr val="accent2"/>
+          </a:fillRef>
+          <a:effectRef idx="1">
+            <a:schemeClr val="accent2"/>
+          </a:effectRef>
+          <a:fontRef idx="minor">
+            <a:schemeClr val="dk1"/>
+          </a:fontRef>
+        </p:style>
+      </p:cxnSp>
+      <p:cxnSp>
+        <p:nvCxnSpPr>
+          <p:cNvPr id="260" name="Elbow Connector 122"/>
+          <p:cNvCxnSpPr>
+            <a:stCxn id="32" idx="3"/>
+          </p:cNvCxnSpPr>
+          <p:nvPr/>
+        </p:nvCxnSpPr>
+        <p:spPr>
+          <a:xfrm flipV="1">
+            <a:off x="3433309" y="2532187"/>
+            <a:ext cx="3599951" cy="1333033"/>
+          </a:xfrm>
+          <a:prstGeom prst="bentConnector3">
+            <a:avLst>
+              <a:gd name="adj1" fmla="val 99954"/>
+            </a:avLst>
+          </a:prstGeom>
+          <a:ln w="19050">
+            <a:solidFill>
+              <a:schemeClr val="accent6">
+                <a:lumMod val="75000"/>
+              </a:schemeClr>
+            </a:solidFill>
+            <a:prstDash val="sysDot"/>
+            <a:headEnd type="none" w="med" len="med"/>
+            <a:tailEnd type="arrow" w="med" len="med"/>
+          </a:ln>
+          <a:effectLst/>
+        </p:spPr>
+        <p:style>
+          <a:lnRef idx="1">
+            <a:schemeClr val="accent2"/>
+          </a:lnRef>
+          <a:fillRef idx="2">
+            <a:schemeClr val="accent2"/>
+          </a:fillRef>
+          <a:effectRef idx="1">
+            <a:schemeClr val="accent2"/>
+          </a:effectRef>
+          <a:fontRef idx="minor">
+            <a:schemeClr val="dk1"/>
+          </a:fontRef>
+        </p:style>
+      </p:cxnSp>
+      <p:cxnSp>
+        <p:nvCxnSpPr>
+          <p:cNvPr id="282" name="Straight Arrow Connector 281"/>
+          <p:cNvCxnSpPr>
+            <a:cxnSpLocks/>
+            <a:endCxn id="73" idx="2"/>
+          </p:cNvCxnSpPr>
+          <p:nvPr/>
+        </p:nvCxnSpPr>
+        <p:spPr>
+          <a:xfrm rot="10800000">
+            <a:off x="9057579" y="1718361"/>
+            <a:ext cx="888432" cy="157891"/>
+          </a:xfrm>
+          <a:prstGeom prst="bentConnector2">
+            <a:avLst/>
+          </a:prstGeom>
+          <a:ln w="19050">
+            <a:solidFill>
+              <a:schemeClr val="accent6">
+                <a:lumMod val="75000"/>
+              </a:schemeClr>
+            </a:solidFill>
+            <a:headEnd type="none" w="med" len="med"/>
+            <a:tailEnd type="arrow" w="med" len="med"/>
+          </a:ln>
+          <a:effectLst/>
+        </p:spPr>
+        <p:style>
+          <a:lnRef idx="1">
+            <a:schemeClr val="accent2"/>
+          </a:lnRef>
+          <a:fillRef idx="2">
+            <a:schemeClr val="accent2"/>
+          </a:fillRef>
+          <a:effectRef idx="1">
+            <a:schemeClr val="accent2"/>
+          </a:effectRef>
+          <a:fontRef idx="minor">
+            <a:schemeClr val="dk1"/>
+          </a:fontRef>
+        </p:style>
+      </p:cxnSp>
+      <p:sp>
+        <p:nvSpPr>
+          <p:cNvPr id="286" name="Flowchart: Decision 96"/>
           <p:cNvSpPr/>
           <p:nvPr/>
         </p:nvSpPr>
         <p:spPr>
           <a:xfrm>
-            <a:off x="2873943" y="2558040"/>
-            <a:ext cx="1323049" cy="346760"/>
-          </a:xfrm>
-          <a:prstGeom prst="rect">
+            <a:off x="9794964" y="2027740"/>
+            <a:ext cx="151092" cy="164505"/>
+          </a:xfrm>
+          <a:prstGeom prst="flowChartDecision">
             <a:avLst/>
           </a:prstGeom>
           <a:solidFill>
@@ -4389,30 +6217,7 @@
           <a:lstStyle/>
           <a:p>
             <a:pPr algn="ctr"/>
-            <a:r>
-              <a:rPr lang="en-US" sz="1050" dirty="0">
-                <a:solidFill>
-                  <a:schemeClr val="bg1"/>
-                </a:solidFill>
-              </a:rPr>
-              <a:t>&lt;&lt;interface&gt;&gt;</a:t>
-            </a:r>
-            <a:br>
-              <a:rPr lang="en-US" sz="1050" dirty="0">
-                <a:solidFill>
-                  <a:schemeClr val="bg1"/>
-                </a:solidFill>
-              </a:rPr>
-            </a:br>
-            <a:r>
-              <a:rPr lang="en-US" sz="1050" dirty="0" err="1">
-                <a:solidFill>
-                  <a:schemeClr val="bg1"/>
-                </a:solidFill>
-              </a:rPr>
-              <a:t>UserPrefsStorage</a:t>
-            </a:r>
-            <a:endParaRPr lang="en-SG" sz="1050" dirty="0">
+            <a:endParaRPr lang="en-US" sz="1050">
               <a:solidFill>
                 <a:schemeClr val="bg1"/>
               </a:solidFill>
@@ -4422,20 +6227,23 @@
       </p:sp>
       <p:cxnSp>
         <p:nvCxnSpPr>
-          <p:cNvPr id="54" name="Straight Arrow Connector 53"/>
+          <p:cNvPr id="287" name="Straight Arrow Connector 286"/>
           <p:cNvCxnSpPr>
-            <a:stCxn id="56" idx="3"/>
-            <a:endCxn id="52" idx="1"/>
+            <a:cxnSpLocks/>
+            <a:stCxn id="286" idx="0"/>
+            <a:endCxn id="180" idx="2"/>
           </p:cNvCxnSpPr>
           <p:nvPr/>
         </p:nvCxnSpPr>
         <p:spPr>
-          <a:xfrm>
-            <a:off x="2653133" y="2726136"/>
-            <a:ext cx="220810" cy="5284"/>
-          </a:xfrm>
-          <a:prstGeom prst="straightConnector1">
-            <a:avLst/>
+          <a:xfrm rot="5400000" flipH="1" flipV="1">
+            <a:off x="10171923" y="1438045"/>
+            <a:ext cx="288282" cy="891108"/>
+          </a:xfrm>
+          <a:prstGeom prst="bentConnector3">
+            <a:avLst>
+              <a:gd name="adj1" fmla="val 50000"/>
+            </a:avLst>
           </a:prstGeom>
           <a:ln w="19050">
             <a:solidFill>
@@ -4465,300 +6273,57 @@
       </p:cxnSp>
       <p:sp>
         <p:nvSpPr>
-          <p:cNvPr id="56" name="Flowchart: Decision 96"/>
-          <p:cNvSpPr/>
+          <p:cNvPr id="296" name="TextBox 295"/>
+          <p:cNvSpPr txBox="1"/>
           <p:nvPr/>
         </p:nvSpPr>
         <p:spPr>
           <a:xfrm>
-            <a:off x="2417085" y="2639446"/>
-            <a:ext cx="236048" cy="173380"/>
-          </a:xfrm>
-          <a:prstGeom prst="flowChartDecision">
+            <a:off x="7129803" y="3826819"/>
+            <a:ext cx="946093" cy="261610"/>
+          </a:xfrm>
+          <a:prstGeom prst="rect">
             <a:avLst/>
           </a:prstGeom>
           <a:noFill/>
-          <a:ln w="19050">
-            <a:solidFill>
-              <a:schemeClr val="accent6">
-                <a:lumMod val="75000"/>
-              </a:schemeClr>
-            </a:solidFill>
-          </a:ln>
-          <a:effectLst/>
-        </p:spPr>
-        <p:style>
-          <a:lnRef idx="1">
-            <a:schemeClr val="accent2"/>
-          </a:lnRef>
-          <a:fillRef idx="2">
-            <a:schemeClr val="accent2"/>
-          </a:fillRef>
-          <a:effectRef idx="1">
-            <a:schemeClr val="accent2"/>
-          </a:effectRef>
-          <a:fontRef idx="minor">
-            <a:schemeClr val="dk1"/>
-          </a:fontRef>
-        </p:style>
-        <p:txBody>
-          <a:bodyPr rtlCol="0" anchor="ctr"/>
-          <a:lstStyle/>
-          <a:p>
-            <a:pPr algn="ctr"/>
-            <a:endParaRPr lang="en-US" sz="1050">
-              <a:solidFill>
-                <a:schemeClr val="bg1"/>
-              </a:solidFill>
-            </a:endParaRPr>
-          </a:p>
-        </p:txBody>
-      </p:sp>
-      <p:cxnSp>
-        <p:nvCxnSpPr>
-          <p:cNvPr id="60" name="Elbow Connector 63"/>
-          <p:cNvCxnSpPr>
-            <a:stCxn id="61" idx="3"/>
-            <a:endCxn id="65" idx="1"/>
-          </p:cNvCxnSpPr>
-          <p:nvPr/>
-        </p:nvCxnSpPr>
-        <p:spPr>
-          <a:xfrm flipV="1">
-            <a:off x="4394804" y="2731420"/>
-            <a:ext cx="223324" cy="1"/>
-          </a:xfrm>
-          <a:prstGeom prst="bentConnector3">
-            <a:avLst>
-              <a:gd name="adj1" fmla="val 50000"/>
-            </a:avLst>
-          </a:prstGeom>
-          <a:ln w="19050">
-            <a:solidFill>
-              <a:schemeClr val="accent6">
-                <a:lumMod val="75000"/>
-              </a:schemeClr>
-            </a:solidFill>
-            <a:prstDash val="sysDot"/>
-            <a:headEnd type="none" w="med" len="med"/>
-            <a:tailEnd type="none" w="med" len="med"/>
-          </a:ln>
-          <a:effectLst/>
-        </p:spPr>
-        <p:style>
-          <a:lnRef idx="1">
-            <a:schemeClr val="accent2"/>
-          </a:lnRef>
-          <a:fillRef idx="2">
-            <a:schemeClr val="accent2"/>
-          </a:fillRef>
-          <a:effectRef idx="1">
-            <a:schemeClr val="accent2"/>
-          </a:effectRef>
-          <a:fontRef idx="minor">
-            <a:schemeClr val="dk1"/>
-          </a:fontRef>
-        </p:style>
-      </p:cxnSp>
-      <p:sp>
-        <p:nvSpPr>
-          <p:cNvPr id="61" name="Isosceles Triangle 102"/>
-          <p:cNvSpPr/>
-          <p:nvPr/>
-        </p:nvSpPr>
-        <p:spPr>
-          <a:xfrm rot="5400000" flipV="1">
-            <a:off x="4171790" y="2643659"/>
-            <a:ext cx="270504" cy="175523"/>
-          </a:xfrm>
-          <a:prstGeom prst="triangle">
-            <a:avLst/>
-          </a:prstGeom>
-          <a:solidFill>
-            <a:schemeClr val="accent6">
-              <a:lumMod val="75000"/>
-            </a:schemeClr>
-          </a:solidFill>
-          <a:ln w="19050">
-            <a:solidFill>
-              <a:schemeClr val="accent6">
-                <a:lumMod val="75000"/>
-              </a:schemeClr>
-            </a:solidFill>
-          </a:ln>
-          <a:effectLst/>
-        </p:spPr>
-        <p:style>
-          <a:lnRef idx="1">
-            <a:schemeClr val="accent2"/>
-          </a:lnRef>
-          <a:fillRef idx="2">
-            <a:schemeClr val="accent2"/>
-          </a:fillRef>
-          <a:effectRef idx="1">
-            <a:schemeClr val="accent2"/>
-          </a:effectRef>
-          <a:fontRef idx="minor">
-            <a:schemeClr val="dk1"/>
-          </a:fontRef>
-        </p:style>
-        <p:txBody>
-          <a:bodyPr rtlCol="0" anchor="ctr"/>
-          <a:lstStyle/>
-          <a:p>
-            <a:pPr algn="ctr"/>
-            <a:endParaRPr lang="en-SG" sz="1050">
-              <a:solidFill>
-                <a:schemeClr val="bg1"/>
-              </a:solidFill>
-            </a:endParaRPr>
-          </a:p>
-        </p:txBody>
-      </p:sp>
-      <p:sp>
-        <p:nvSpPr>
-          <p:cNvPr id="65" name="Rectangle 8"/>
-          <p:cNvSpPr/>
-          <p:nvPr/>
-        </p:nvSpPr>
-        <p:spPr>
-          <a:xfrm>
-            <a:off x="4618128" y="2558040"/>
-            <a:ext cx="1093635" cy="346760"/>
-          </a:xfrm>
-          <a:prstGeom prst="rect">
-            <a:avLst/>
-          </a:prstGeom>
-          <a:solidFill>
-            <a:schemeClr val="accent6">
-              <a:lumMod val="75000"/>
-            </a:schemeClr>
-          </a:solidFill>
-          <a:ln w="19050">
-            <a:solidFill>
-              <a:schemeClr val="accent6">
-                <a:lumMod val="75000"/>
-              </a:schemeClr>
-            </a:solidFill>
-          </a:ln>
-          <a:effectLst/>
-        </p:spPr>
-        <p:style>
-          <a:lnRef idx="1">
-            <a:schemeClr val="accent2"/>
-          </a:lnRef>
-          <a:fillRef idx="2">
-            <a:schemeClr val="accent2"/>
-          </a:fillRef>
-          <a:effectRef idx="1">
-            <a:schemeClr val="accent2"/>
-          </a:effectRef>
-          <a:fontRef idx="minor">
-            <a:schemeClr val="dk1"/>
-          </a:fontRef>
-        </p:style>
-        <p:txBody>
-          <a:bodyPr rtlCol="0" anchor="ctr"/>
-          <a:lstStyle/>
-          <a:p>
-            <a:pPr algn="ctr"/>
-            <a:r>
-              <a:rPr lang="en-US" sz="1050" dirty="0" err="1">
-                <a:solidFill>
-                  <a:schemeClr val="bg1"/>
-                </a:solidFill>
-              </a:rPr>
-              <a:t>JsonUserPrefs</a:t>
-            </a:r>
-            <a:br>
+        </p:spPr>
+        <p:txBody>
+          <a:bodyPr wrap="none" rtlCol="0">
+            <a:spAutoFit/>
+          </a:bodyPr>
+          <a:lstStyle/>
+          <a:p>
+            <a:r>
               <a:rPr lang="en-US" sz="1050" dirty="0">
-                <a:solidFill>
-                  <a:schemeClr val="bg1"/>
-                </a:solidFill>
-              </a:rPr>
-            </a:br>
-            <a:r>
-              <a:rPr lang="en-US" sz="1050" dirty="0">
-                <a:solidFill>
-                  <a:schemeClr val="bg1"/>
-                </a:solidFill>
-              </a:rPr>
-              <a:t>Storage</a:t>
-            </a:r>
-            <a:endParaRPr lang="en-SG" sz="1050" dirty="0">
-              <a:solidFill>
-                <a:schemeClr val="bg1"/>
-              </a:solidFill>
-            </a:endParaRPr>
-          </a:p>
-        </p:txBody>
-      </p:sp>
-      <p:sp>
-        <p:nvSpPr>
-          <p:cNvPr id="66" name="Rectangle 8"/>
-          <p:cNvSpPr/>
-          <p:nvPr/>
-        </p:nvSpPr>
-        <p:spPr>
-          <a:xfrm>
-            <a:off x="6019800" y="3160410"/>
-            <a:ext cx="1200707" cy="346760"/>
-          </a:xfrm>
-          <a:prstGeom prst="rect">
-            <a:avLst/>
-          </a:prstGeom>
-          <a:ln w="19050"/>
-          <a:effectLst/>
-        </p:spPr>
-        <p:style>
-          <a:lnRef idx="1">
-            <a:schemeClr val="accent6"/>
-          </a:lnRef>
-          <a:fillRef idx="2">
-            <a:schemeClr val="accent6"/>
-          </a:fillRef>
-          <a:effectRef idx="1">
-            <a:schemeClr val="accent6"/>
-          </a:effectRef>
-          <a:fontRef idx="minor">
-            <a:schemeClr val="dk1"/>
-          </a:fontRef>
-        </p:style>
-        <p:txBody>
-          <a:bodyPr rtlCol="0" anchor="ctr"/>
-          <a:lstStyle/>
-          <a:p>
-            <a:pPr algn="ctr"/>
-            <a:r>
-              <a:rPr lang="en-US" sz="1050" b="1" dirty="0" err="1">
                 <a:solidFill>
                   <a:schemeClr val="accent6">
                     <a:lumMod val="75000"/>
                   </a:schemeClr>
                 </a:solidFill>
               </a:rPr>
-              <a:t>XmlSerializable</a:t>
-            </a:r>
-            <a:br>
-              <a:rPr lang="en-US" sz="1050" b="1" dirty="0">
+              <a:t>e</a:t>
+            </a:r>
+            <a:r>
+              <a:rPr lang="en-US" sz="1050" dirty="0" smtClean="0">
                 <a:solidFill>
                   <a:schemeClr val="accent6">
                     <a:lumMod val="75000"/>
                   </a:schemeClr>
                 </a:solidFill>
               </a:rPr>
-            </a:br>
-            <a:r>
-              <a:rPr lang="en-US" sz="1050" b="1" dirty="0" err="1">
+              <a:t>xports </a:t>
+            </a:r>
+            <a:r>
+              <a:rPr lang="en-US" sz="1100" dirty="0" smtClean="0">
                 <a:solidFill>
                   <a:schemeClr val="accent6">
                     <a:lumMod val="75000"/>
                   </a:schemeClr>
                 </a:solidFill>
               </a:rPr>
-              <a:t>AddressBook</a:t>
-            </a:r>
-            <a:endParaRPr lang="en-SG" sz="1050" b="1" dirty="0">
+              <a:t>using</a:t>
+            </a:r>
+            <a:endParaRPr lang="en-US" sz="1100" dirty="0">
               <a:solidFill>
                 <a:schemeClr val="accent6">
                   <a:lumMod val="75000"/>
@@ -4768,94 +6333,49 @@
           </a:p>
         </p:txBody>
       </p:sp>
-      <p:cxnSp>
-        <p:nvCxnSpPr>
-          <p:cNvPr id="70" name="Elbow Connector 122"/>
-          <p:cNvCxnSpPr>
-            <a:stCxn id="74" idx="0"/>
-            <a:endCxn id="73" idx="2"/>
-          </p:cNvCxnSpPr>
+      <p:sp>
+        <p:nvSpPr>
+          <p:cNvPr id="297" name="TextBox 296"/>
+          <p:cNvSpPr txBox="1"/>
           <p:nvPr/>
-        </p:nvCxnSpPr>
-        <p:spPr>
-          <a:xfrm rot="5400000" flipH="1" flipV="1">
-            <a:off x="8077993" y="2992020"/>
-            <a:ext cx="335208" cy="12700"/>
-          </a:xfrm>
-          <a:prstGeom prst="bentConnector3">
-            <a:avLst>
-              <a:gd name="adj1" fmla="val 50000"/>
-            </a:avLst>
-          </a:prstGeom>
-          <a:ln w="19050">
-            <a:prstDash val="sysDot"/>
-            <a:headEnd type="none" w="med" len="med"/>
-            <a:tailEnd type="arrow" w="med" len="med"/>
-          </a:ln>
-          <a:effectLst/>
-        </p:spPr>
-        <p:style>
-          <a:lnRef idx="1">
-            <a:schemeClr val="accent6"/>
-          </a:lnRef>
-          <a:fillRef idx="2">
-            <a:schemeClr val="accent6"/>
-          </a:fillRef>
-          <a:effectRef idx="1">
-            <a:schemeClr val="accent6"/>
-          </a:effectRef>
-          <a:fontRef idx="minor">
-            <a:schemeClr val="dk1"/>
-          </a:fontRef>
-        </p:style>
-      </p:cxnSp>
-      <p:sp>
-        <p:nvSpPr>
-          <p:cNvPr id="73" name="Rectangle 8"/>
-          <p:cNvSpPr/>
-          <p:nvPr/>
-        </p:nvSpPr>
-        <p:spPr>
-          <a:xfrm>
-            <a:off x="7615738" y="2477656"/>
-            <a:ext cx="1259718" cy="346760"/>
+        </p:nvSpPr>
+        <p:spPr>
+          <a:xfrm rot="16200000">
+            <a:off x="6654596" y="2825003"/>
+            <a:ext cx="946093" cy="261610"/>
           </a:xfrm>
           <a:prstGeom prst="rect">
             <a:avLst/>
           </a:prstGeom>
-          <a:ln w="19050"/>
-          <a:effectLst/>
-        </p:spPr>
-        <p:style>
-          <a:lnRef idx="1">
-            <a:schemeClr val="accent6"/>
-          </a:lnRef>
-          <a:fillRef idx="2">
-            <a:schemeClr val="accent6"/>
-          </a:fillRef>
-          <a:effectRef idx="1">
-            <a:schemeClr val="accent6"/>
-          </a:effectRef>
-          <a:fontRef idx="minor">
-            <a:schemeClr val="dk1"/>
-          </a:fontRef>
-        </p:style>
-        <p:txBody>
-          <a:bodyPr rtlCol="0" anchor="ctr"/>
-          <a:lstStyle/>
-          <a:p>
-            <a:pPr algn="ctr"/>
-            <a:r>
-              <a:rPr lang="en-US" sz="1050" b="1" dirty="0" err="1">
+          <a:noFill/>
+        </p:spPr>
+        <p:txBody>
+          <a:bodyPr wrap="none" rtlCol="0">
+            <a:spAutoFit/>
+          </a:bodyPr>
+          <a:lstStyle/>
+          <a:p>
+            <a:r>
+              <a:rPr lang="en-US" sz="1050" dirty="0">
                 <a:solidFill>
                   <a:schemeClr val="accent6">
                     <a:lumMod val="75000"/>
                   </a:schemeClr>
                 </a:solidFill>
               </a:rPr>
-              <a:t>XmlAdaptedTag</a:t>
-            </a:r>
-            <a:endParaRPr lang="en-SG" sz="1050" b="1" dirty="0">
+              <a:t>e</a:t>
+            </a:r>
+            <a:r>
+              <a:rPr lang="en-US" sz="1050" dirty="0" smtClean="0">
+                <a:solidFill>
+                  <a:schemeClr val="accent6">
+                    <a:lumMod val="75000"/>
+                  </a:schemeClr>
+                </a:solidFill>
+              </a:rPr>
+              <a:t>xports using</a:t>
+            </a:r>
+            <a:endParaRPr lang="en-US" sz="1050" dirty="0">
               <a:solidFill>
                 <a:schemeClr val="accent6">
                   <a:lumMod val="75000"/>
@@ -4865,363 +6385,6 @@
           </a:p>
         </p:txBody>
       </p:sp>
-      <p:sp>
-        <p:nvSpPr>
-          <p:cNvPr id="74" name="Rectangle 8"/>
-          <p:cNvSpPr/>
-          <p:nvPr/>
-        </p:nvSpPr>
-        <p:spPr>
-          <a:xfrm>
-            <a:off x="7615738" y="3159624"/>
-            <a:ext cx="1259718" cy="346760"/>
-          </a:xfrm>
-          <a:prstGeom prst="rect">
-            <a:avLst/>
-          </a:prstGeom>
-          <a:ln w="19050"/>
-          <a:effectLst/>
-        </p:spPr>
-        <p:style>
-          <a:lnRef idx="1">
-            <a:schemeClr val="accent6"/>
-          </a:lnRef>
-          <a:fillRef idx="2">
-            <a:schemeClr val="accent6"/>
-          </a:fillRef>
-          <a:effectRef idx="1">
-            <a:schemeClr val="accent6"/>
-          </a:effectRef>
-          <a:fontRef idx="minor">
-            <a:schemeClr val="dk1"/>
-          </a:fontRef>
-        </p:style>
-        <p:txBody>
-          <a:bodyPr rtlCol="0" anchor="ctr"/>
-          <a:lstStyle/>
-          <a:p>
-            <a:pPr algn="ctr"/>
-            <a:r>
-              <a:rPr lang="en-US" sz="1050" b="1" dirty="0" err="1">
-                <a:solidFill>
-                  <a:schemeClr val="accent6">
-                    <a:lumMod val="75000"/>
-                  </a:schemeClr>
-                </a:solidFill>
-              </a:rPr>
-              <a:t>XmlAdaptedPerson</a:t>
-            </a:r>
-            <a:endParaRPr lang="en-SG" sz="1050" b="1" dirty="0">
-              <a:solidFill>
-                <a:schemeClr val="accent6">
-                  <a:lumMod val="75000"/>
-                </a:schemeClr>
-              </a:solidFill>
-            </a:endParaRPr>
-          </a:p>
-        </p:txBody>
-      </p:sp>
-      <p:cxnSp>
-        <p:nvCxnSpPr>
-          <p:cNvPr id="77" name="Elbow Connector 122"/>
-          <p:cNvCxnSpPr>
-            <a:stCxn id="66" idx="3"/>
-            <a:endCxn id="74" idx="1"/>
-          </p:cNvCxnSpPr>
-          <p:nvPr/>
-        </p:nvCxnSpPr>
-        <p:spPr>
-          <a:xfrm flipV="1">
-            <a:off x="7220507" y="3333004"/>
-            <a:ext cx="395231" cy="786"/>
-          </a:xfrm>
-          <a:prstGeom prst="bentConnector3">
-            <a:avLst>
-              <a:gd name="adj1" fmla="val 50000"/>
-            </a:avLst>
-          </a:prstGeom>
-          <a:ln w="19050">
-            <a:prstDash val="sysDot"/>
-            <a:headEnd type="none" w="med" len="med"/>
-            <a:tailEnd type="arrow" w="med" len="med"/>
-          </a:ln>
-          <a:effectLst/>
-        </p:spPr>
-        <p:style>
-          <a:lnRef idx="1">
-            <a:schemeClr val="accent6"/>
-          </a:lnRef>
-          <a:fillRef idx="2">
-            <a:schemeClr val="accent6"/>
-          </a:fillRef>
-          <a:effectRef idx="1">
-            <a:schemeClr val="accent6"/>
-          </a:effectRef>
-          <a:fontRef idx="minor">
-            <a:schemeClr val="dk1"/>
-          </a:fontRef>
-        </p:style>
-      </p:cxnSp>
-      <p:grpSp>
-        <p:nvGrpSpPr>
-          <p:cNvPr id="4" name="Group 3">
-            <a:extLst>
-              <a:ext uri="{FF2B5EF4-FFF2-40B4-BE49-F238E27FC236}">
-                <a16:creationId xmlns:a16="http://schemas.microsoft.com/office/drawing/2014/main" id="{3FEF5B98-D3DD-4A37-9AAA-BE6F265ED468}"/>
-              </a:ext>
-            </a:extLst>
-          </p:cNvPr>
-          <p:cNvGrpSpPr/>
-          <p:nvPr/>
-        </p:nvGrpSpPr>
-        <p:grpSpPr>
-          <a:xfrm>
-            <a:off x="2420001" y="3871795"/>
-            <a:ext cx="456858" cy="173380"/>
-            <a:chOff x="2420001" y="3871795"/>
-            <a:chExt cx="456858" cy="173380"/>
-          </a:xfrm>
-        </p:grpSpPr>
-        <p:cxnSp>
-          <p:nvCxnSpPr>
-            <p:cNvPr id="26" name="Straight Arrow Connector 25">
-              <a:extLst>
-                <a:ext uri="{FF2B5EF4-FFF2-40B4-BE49-F238E27FC236}">
-                  <a16:creationId xmlns:a16="http://schemas.microsoft.com/office/drawing/2014/main" id="{A2AB4250-FF21-406B-98CC-8CD1CCEC2E0E}"/>
-                </a:ext>
-              </a:extLst>
-            </p:cNvPr>
-            <p:cNvCxnSpPr>
-              <a:stCxn id="27" idx="3"/>
-            </p:cNvCxnSpPr>
-            <p:nvPr/>
-          </p:nvCxnSpPr>
-          <p:spPr>
-            <a:xfrm>
-              <a:off x="2656049" y="3958485"/>
-              <a:ext cx="220810" cy="5284"/>
-            </a:xfrm>
-            <a:prstGeom prst="straightConnector1">
-              <a:avLst/>
-            </a:prstGeom>
-            <a:ln w="19050">
-              <a:solidFill>
-                <a:schemeClr val="accent6">
-                  <a:lumMod val="75000"/>
-                </a:schemeClr>
-              </a:solidFill>
-              <a:headEnd type="none" w="med" len="med"/>
-              <a:tailEnd type="arrow" w="med" len="med"/>
-            </a:ln>
-            <a:effectLst/>
-          </p:spPr>
-          <p:style>
-            <a:lnRef idx="1">
-              <a:schemeClr val="accent2"/>
-            </a:lnRef>
-            <a:fillRef idx="2">
-              <a:schemeClr val="accent2"/>
-            </a:fillRef>
-            <a:effectRef idx="1">
-              <a:schemeClr val="accent2"/>
-            </a:effectRef>
-            <a:fontRef idx="minor">
-              <a:schemeClr val="dk1"/>
-            </a:fontRef>
-          </p:style>
-        </p:cxnSp>
-        <p:sp>
-          <p:nvSpPr>
-            <p:cNvPr id="27" name="Flowchart: Decision 96">
-              <a:extLst>
-                <a:ext uri="{FF2B5EF4-FFF2-40B4-BE49-F238E27FC236}">
-                  <a16:creationId xmlns:a16="http://schemas.microsoft.com/office/drawing/2014/main" id="{1CB1A82D-B7B9-4751-B844-172526D6A2BB}"/>
-                </a:ext>
-              </a:extLst>
-            </p:cNvPr>
-            <p:cNvSpPr/>
-            <p:nvPr/>
-          </p:nvSpPr>
-          <p:spPr>
-            <a:xfrm>
-              <a:off x="2420001" y="3871795"/>
-              <a:ext cx="236048" cy="173380"/>
-            </a:xfrm>
-            <a:prstGeom prst="flowChartDecision">
-              <a:avLst/>
-            </a:prstGeom>
-            <a:noFill/>
-            <a:ln w="19050">
-              <a:solidFill>
-                <a:schemeClr val="accent6">
-                  <a:lumMod val="75000"/>
-                </a:schemeClr>
-              </a:solidFill>
-            </a:ln>
-            <a:effectLst/>
-          </p:spPr>
-          <p:style>
-            <a:lnRef idx="1">
-              <a:schemeClr val="accent2"/>
-            </a:lnRef>
-            <a:fillRef idx="2">
-              <a:schemeClr val="accent2"/>
-            </a:fillRef>
-            <a:effectRef idx="1">
-              <a:schemeClr val="accent2"/>
-            </a:effectRef>
-            <a:fontRef idx="minor">
-              <a:schemeClr val="dk1"/>
-            </a:fontRef>
-          </p:style>
-          <p:txBody>
-            <a:bodyPr rtlCol="0" anchor="ctr"/>
-            <a:lstStyle/>
-            <a:p>
-              <a:pPr algn="ctr"/>
-              <a:endParaRPr lang="en-US" sz="1050">
-                <a:solidFill>
-                  <a:schemeClr val="bg1"/>
-                </a:solidFill>
-              </a:endParaRPr>
-            </a:p>
-          </p:txBody>
-        </p:sp>
-      </p:grpSp>
-      <p:sp>
-        <p:nvSpPr>
-          <p:cNvPr id="32" name="Rectangle 8">
-            <a:extLst>
-              <a:ext uri="{FF2B5EF4-FFF2-40B4-BE49-F238E27FC236}">
-                <a16:creationId xmlns:a16="http://schemas.microsoft.com/office/drawing/2014/main" id="{A2F02829-0356-4FB8-9CE0-B88093B4E8AF}"/>
-              </a:ext>
-            </a:extLst>
-          </p:cNvPr>
-          <p:cNvSpPr/>
-          <p:nvPr/>
-        </p:nvSpPr>
-        <p:spPr>
-          <a:xfrm>
-            <a:off x="2873943" y="3807012"/>
-            <a:ext cx="1323049" cy="346760"/>
-          </a:xfrm>
-          <a:prstGeom prst="rect">
-            <a:avLst/>
-          </a:prstGeom>
-          <a:solidFill>
-            <a:schemeClr val="accent6">
-              <a:lumMod val="75000"/>
-            </a:schemeClr>
-          </a:solidFill>
-          <a:ln w="19050">
-            <a:solidFill>
-              <a:schemeClr val="accent6">
-                <a:lumMod val="75000"/>
-              </a:schemeClr>
-            </a:solidFill>
-          </a:ln>
-          <a:effectLst/>
-        </p:spPr>
-        <p:style>
-          <a:lnRef idx="1">
-            <a:schemeClr val="accent2"/>
-          </a:lnRef>
-          <a:fillRef idx="2">
-            <a:schemeClr val="accent2"/>
-          </a:fillRef>
-          <a:effectRef idx="1">
-            <a:schemeClr val="accent2"/>
-          </a:effectRef>
-          <a:fontRef idx="minor">
-            <a:schemeClr val="dk1"/>
-          </a:fontRef>
-        </p:style>
-        <p:txBody>
-          <a:bodyPr rtlCol="0" anchor="ctr"/>
-          <a:lstStyle/>
-          <a:p>
-            <a:pPr algn="ctr"/>
-            <a:r>
-              <a:rPr lang="en-US" sz="1050" dirty="0">
-                <a:solidFill>
-                  <a:schemeClr val="bg1"/>
-                </a:solidFill>
-              </a:rPr>
-              <a:t>&lt;&lt;interface&gt;&gt;</a:t>
-            </a:r>
-            <a:br>
-              <a:rPr lang="en-US" sz="1050" dirty="0">
-                <a:solidFill>
-                  <a:schemeClr val="bg1"/>
-                </a:solidFill>
-              </a:rPr>
-            </a:br>
-            <a:r>
-              <a:rPr lang="en-US" sz="1050" dirty="0" err="1">
-                <a:solidFill>
-                  <a:schemeClr val="bg1"/>
-                </a:solidFill>
-              </a:rPr>
-              <a:t>ImportExportStorage</a:t>
-            </a:r>
-            <a:endParaRPr lang="en-SG" sz="1050" dirty="0">
-              <a:solidFill>
-                <a:schemeClr val="bg1"/>
-              </a:solidFill>
-            </a:endParaRPr>
-          </a:p>
-        </p:txBody>
-      </p:sp>
-      <p:cxnSp>
-        <p:nvCxnSpPr>
-          <p:cNvPr id="33" name="Elbow Connector 63">
-            <a:extLst>
-              <a:ext uri="{FF2B5EF4-FFF2-40B4-BE49-F238E27FC236}">
-                <a16:creationId xmlns:a16="http://schemas.microsoft.com/office/drawing/2014/main" id="{95B6788E-D3FA-4B57-A044-3E5CE08D4084}"/>
-              </a:ext>
-            </a:extLst>
-          </p:cNvPr>
-          <p:cNvCxnSpPr>
-            <a:cxnSpLocks/>
-            <a:endCxn id="50" idx="2"/>
-          </p:cNvCxnSpPr>
-          <p:nvPr/>
-        </p:nvCxnSpPr>
-        <p:spPr>
-          <a:xfrm flipV="1">
-            <a:off x="4212007" y="3505200"/>
-            <a:ext cx="994276" cy="448004"/>
-          </a:xfrm>
-          <a:prstGeom prst="bentConnector2">
-            <a:avLst/>
-          </a:prstGeom>
-          <a:ln w="19050">
-            <a:solidFill>
-              <a:schemeClr val="accent6">
-                <a:lumMod val="75000"/>
-              </a:schemeClr>
-            </a:solidFill>
-            <a:prstDash val="sysDot"/>
-            <a:headEnd type="none" w="med" len="med"/>
-            <a:tailEnd type="arrow" w="med" len="med"/>
-          </a:ln>
-          <a:effectLst/>
-        </p:spPr>
-        <p:style>
-          <a:lnRef idx="1">
-            <a:schemeClr val="accent2"/>
-          </a:lnRef>
-          <a:fillRef idx="2">
-            <a:schemeClr val="accent2"/>
-          </a:fillRef>
-          <a:effectRef idx="1">
-            <a:schemeClr val="accent2"/>
-          </a:effectRef>
-          <a:fontRef idx="minor">
-            <a:schemeClr val="dk1"/>
-          </a:fontRef>
-        </p:style>
-      </p:cxnSp>
     </p:spTree>
     <p:extLst>
       <p:ext uri="{BB962C8B-B14F-4D97-AF65-F5344CB8AC3E}">

</xml_diff>